<commit_message>
Added whole system diagram to last slide.
</commit_message>
<xml_diff>
--- a/Documentation/RDMP Presentation.pptx
+++ b/Documentation/RDMP Presentation.pptx
@@ -24,6 +24,7 @@
     <p:sldId id="281" r:id="rId18"/>
     <p:sldId id="270" r:id="rId19"/>
     <p:sldId id="271" r:id="rId20"/>
+    <p:sldId id="293" r:id="rId21"/>
   </p:sldIdLst>
   <p:sldSz cx="12192000" cy="6858000"/>
   <p:notesSz cx="6858000" cy="9144000"/>
@@ -150,6 +151,7 @@
             <p14:sldId id="281"/>
             <p14:sldId id="270"/>
             <p14:sldId id="271"/>
+            <p14:sldId id="293"/>
           </p14:sldIdLst>
         </p14:section>
       </p14:sectionLst>
@@ -332,9 +334,9 @@
           <a:p>
             <a:fld id="{958A630C-F9C1-4722-A787-564B801DC51B}" type="datetimeFigureOut">
               <a:rPr lang="en-GB" smtClean="0"/>
-              <a:t>18/07/2017</a:t>
+              <a:t>21/11/2018</a:t>
             </a:fld>
-            <a:endParaRPr lang="en-GB"/>
+            <a:endParaRPr lang="en-GB" dirty="0"/>
           </a:p>
         </p:txBody>
       </p:sp>
@@ -353,7 +355,7 @@
           <a:bodyPr/>
           <a:lstStyle/>
           <a:p>
-            <a:endParaRPr lang="en-GB"/>
+            <a:endParaRPr lang="en-GB" dirty="0"/>
           </a:p>
         </p:txBody>
       </p:sp>
@@ -376,7 +378,7 @@
               <a:rPr lang="en-GB" smtClean="0"/>
               <a:t>‹#›</a:t>
             </a:fld>
-            <a:endParaRPr lang="en-GB"/>
+            <a:endParaRPr lang="en-GB" dirty="0"/>
           </a:p>
         </p:txBody>
       </p:sp>
@@ -502,9 +504,9 @@
           <a:p>
             <a:fld id="{958A630C-F9C1-4722-A787-564B801DC51B}" type="datetimeFigureOut">
               <a:rPr lang="en-GB" smtClean="0"/>
-              <a:t>18/07/2017</a:t>
+              <a:t>21/11/2018</a:t>
             </a:fld>
-            <a:endParaRPr lang="en-GB"/>
+            <a:endParaRPr lang="en-GB" dirty="0"/>
           </a:p>
         </p:txBody>
       </p:sp>
@@ -523,7 +525,7 @@
           <a:bodyPr/>
           <a:lstStyle/>
           <a:p>
-            <a:endParaRPr lang="en-GB"/>
+            <a:endParaRPr lang="en-GB" dirty="0"/>
           </a:p>
         </p:txBody>
       </p:sp>
@@ -546,7 +548,7 @@
               <a:rPr lang="en-GB" smtClean="0"/>
               <a:t>‹#›</a:t>
             </a:fld>
-            <a:endParaRPr lang="en-GB"/>
+            <a:endParaRPr lang="en-GB" dirty="0"/>
           </a:p>
         </p:txBody>
       </p:sp>
@@ -682,9 +684,9 @@
           <a:p>
             <a:fld id="{958A630C-F9C1-4722-A787-564B801DC51B}" type="datetimeFigureOut">
               <a:rPr lang="en-GB" smtClean="0"/>
-              <a:t>18/07/2017</a:t>
+              <a:t>21/11/2018</a:t>
             </a:fld>
-            <a:endParaRPr lang="en-GB"/>
+            <a:endParaRPr lang="en-GB" dirty="0"/>
           </a:p>
         </p:txBody>
       </p:sp>
@@ -703,7 +705,7 @@
           <a:bodyPr/>
           <a:lstStyle/>
           <a:p>
-            <a:endParaRPr lang="en-GB"/>
+            <a:endParaRPr lang="en-GB" dirty="0"/>
           </a:p>
         </p:txBody>
       </p:sp>
@@ -726,7 +728,7 @@
               <a:rPr lang="en-GB" smtClean="0"/>
               <a:t>‹#›</a:t>
             </a:fld>
-            <a:endParaRPr lang="en-GB"/>
+            <a:endParaRPr lang="en-GB" dirty="0"/>
           </a:p>
         </p:txBody>
       </p:sp>
@@ -852,9 +854,9 @@
           <a:p>
             <a:fld id="{958A630C-F9C1-4722-A787-564B801DC51B}" type="datetimeFigureOut">
               <a:rPr lang="en-GB" smtClean="0"/>
-              <a:t>18/07/2017</a:t>
+              <a:t>21/11/2018</a:t>
             </a:fld>
-            <a:endParaRPr lang="en-GB"/>
+            <a:endParaRPr lang="en-GB" dirty="0"/>
           </a:p>
         </p:txBody>
       </p:sp>
@@ -873,7 +875,7 @@
           <a:bodyPr/>
           <a:lstStyle/>
           <a:p>
-            <a:endParaRPr lang="en-GB"/>
+            <a:endParaRPr lang="en-GB" dirty="0"/>
           </a:p>
         </p:txBody>
       </p:sp>
@@ -896,7 +898,7 @@
               <a:rPr lang="en-GB" smtClean="0"/>
               <a:t>‹#›</a:t>
             </a:fld>
-            <a:endParaRPr lang="en-GB"/>
+            <a:endParaRPr lang="en-GB" dirty="0"/>
           </a:p>
         </p:txBody>
       </p:sp>
@@ -1098,9 +1100,9 @@
           <a:p>
             <a:fld id="{958A630C-F9C1-4722-A787-564B801DC51B}" type="datetimeFigureOut">
               <a:rPr lang="en-GB" smtClean="0"/>
-              <a:t>18/07/2017</a:t>
+              <a:t>21/11/2018</a:t>
             </a:fld>
-            <a:endParaRPr lang="en-GB"/>
+            <a:endParaRPr lang="en-GB" dirty="0"/>
           </a:p>
         </p:txBody>
       </p:sp>
@@ -1119,7 +1121,7 @@
           <a:bodyPr/>
           <a:lstStyle/>
           <a:p>
-            <a:endParaRPr lang="en-GB"/>
+            <a:endParaRPr lang="en-GB" dirty="0"/>
           </a:p>
         </p:txBody>
       </p:sp>
@@ -1142,7 +1144,7 @@
               <a:rPr lang="en-GB" smtClean="0"/>
               <a:t>‹#›</a:t>
             </a:fld>
-            <a:endParaRPr lang="en-GB"/>
+            <a:endParaRPr lang="en-GB" dirty="0"/>
           </a:p>
         </p:txBody>
       </p:sp>
@@ -1330,9 +1332,9 @@
           <a:p>
             <a:fld id="{958A630C-F9C1-4722-A787-564B801DC51B}" type="datetimeFigureOut">
               <a:rPr lang="en-GB" smtClean="0"/>
-              <a:t>18/07/2017</a:t>
+              <a:t>21/11/2018</a:t>
             </a:fld>
-            <a:endParaRPr lang="en-GB"/>
+            <a:endParaRPr lang="en-GB" dirty="0"/>
           </a:p>
         </p:txBody>
       </p:sp>
@@ -1351,7 +1353,7 @@
           <a:bodyPr/>
           <a:lstStyle/>
           <a:p>
-            <a:endParaRPr lang="en-GB"/>
+            <a:endParaRPr lang="en-GB" dirty="0"/>
           </a:p>
         </p:txBody>
       </p:sp>
@@ -1374,7 +1376,7 @@
               <a:rPr lang="en-GB" smtClean="0"/>
               <a:t>‹#›</a:t>
             </a:fld>
-            <a:endParaRPr lang="en-GB"/>
+            <a:endParaRPr lang="en-GB" dirty="0"/>
           </a:p>
         </p:txBody>
       </p:sp>
@@ -1697,9 +1699,9 @@
           <a:p>
             <a:fld id="{958A630C-F9C1-4722-A787-564B801DC51B}" type="datetimeFigureOut">
               <a:rPr lang="en-GB" smtClean="0"/>
-              <a:t>18/07/2017</a:t>
+              <a:t>21/11/2018</a:t>
             </a:fld>
-            <a:endParaRPr lang="en-GB"/>
+            <a:endParaRPr lang="en-GB" dirty="0"/>
           </a:p>
         </p:txBody>
       </p:sp>
@@ -1718,7 +1720,7 @@
           <a:bodyPr/>
           <a:lstStyle/>
           <a:p>
-            <a:endParaRPr lang="en-GB"/>
+            <a:endParaRPr lang="en-GB" dirty="0"/>
           </a:p>
         </p:txBody>
       </p:sp>
@@ -1741,7 +1743,7 @@
               <a:rPr lang="en-GB" smtClean="0"/>
               <a:t>‹#›</a:t>
             </a:fld>
-            <a:endParaRPr lang="en-GB"/>
+            <a:endParaRPr lang="en-GB" dirty="0"/>
           </a:p>
         </p:txBody>
       </p:sp>
@@ -1815,9 +1817,9 @@
           <a:p>
             <a:fld id="{958A630C-F9C1-4722-A787-564B801DC51B}" type="datetimeFigureOut">
               <a:rPr lang="en-GB" smtClean="0"/>
-              <a:t>18/07/2017</a:t>
+              <a:t>21/11/2018</a:t>
             </a:fld>
-            <a:endParaRPr lang="en-GB"/>
+            <a:endParaRPr lang="en-GB" dirty="0"/>
           </a:p>
         </p:txBody>
       </p:sp>
@@ -1836,7 +1838,7 @@
           <a:bodyPr/>
           <a:lstStyle/>
           <a:p>
-            <a:endParaRPr lang="en-GB"/>
+            <a:endParaRPr lang="en-GB" dirty="0"/>
           </a:p>
         </p:txBody>
       </p:sp>
@@ -1859,7 +1861,7 @@
               <a:rPr lang="en-GB" smtClean="0"/>
               <a:t>‹#›</a:t>
             </a:fld>
-            <a:endParaRPr lang="en-GB"/>
+            <a:endParaRPr lang="en-GB" dirty="0"/>
           </a:p>
         </p:txBody>
       </p:sp>
@@ -1910,9 +1912,9 @@
           <a:p>
             <a:fld id="{958A630C-F9C1-4722-A787-564B801DC51B}" type="datetimeFigureOut">
               <a:rPr lang="en-GB" smtClean="0"/>
-              <a:t>18/07/2017</a:t>
+              <a:t>21/11/2018</a:t>
             </a:fld>
-            <a:endParaRPr lang="en-GB"/>
+            <a:endParaRPr lang="en-GB" dirty="0"/>
           </a:p>
         </p:txBody>
       </p:sp>
@@ -1931,7 +1933,7 @@
           <a:bodyPr/>
           <a:lstStyle/>
           <a:p>
-            <a:endParaRPr lang="en-GB"/>
+            <a:endParaRPr lang="en-GB" dirty="0"/>
           </a:p>
         </p:txBody>
       </p:sp>
@@ -1954,7 +1956,7 @@
               <a:rPr lang="en-GB" smtClean="0"/>
               <a:t>‹#›</a:t>
             </a:fld>
-            <a:endParaRPr lang="en-GB"/>
+            <a:endParaRPr lang="en-GB" dirty="0"/>
           </a:p>
         </p:txBody>
       </p:sp>
@@ -2187,9 +2189,9 @@
           <a:p>
             <a:fld id="{958A630C-F9C1-4722-A787-564B801DC51B}" type="datetimeFigureOut">
               <a:rPr lang="en-GB" smtClean="0"/>
-              <a:t>18/07/2017</a:t>
+              <a:t>21/11/2018</a:t>
             </a:fld>
-            <a:endParaRPr lang="en-GB"/>
+            <a:endParaRPr lang="en-GB" dirty="0"/>
           </a:p>
         </p:txBody>
       </p:sp>
@@ -2208,7 +2210,7 @@
           <a:bodyPr/>
           <a:lstStyle/>
           <a:p>
-            <a:endParaRPr lang="en-GB"/>
+            <a:endParaRPr lang="en-GB" dirty="0"/>
           </a:p>
         </p:txBody>
       </p:sp>
@@ -2231,7 +2233,7 @@
               <a:rPr lang="en-GB" smtClean="0"/>
               <a:t>‹#›</a:t>
             </a:fld>
-            <a:endParaRPr lang="en-GB"/>
+            <a:endParaRPr lang="en-GB" dirty="0"/>
           </a:p>
         </p:txBody>
       </p:sp>
@@ -2354,7 +2356,7 @@
             </a:lvl9pPr>
           </a:lstStyle>
           <a:p>
-            <a:endParaRPr lang="en-GB"/>
+            <a:endParaRPr lang="en-GB" dirty="0"/>
           </a:p>
         </p:txBody>
       </p:sp>
@@ -2440,9 +2442,9 @@
           <a:p>
             <a:fld id="{958A630C-F9C1-4722-A787-564B801DC51B}" type="datetimeFigureOut">
               <a:rPr lang="en-GB" smtClean="0"/>
-              <a:t>18/07/2017</a:t>
+              <a:t>21/11/2018</a:t>
             </a:fld>
-            <a:endParaRPr lang="en-GB"/>
+            <a:endParaRPr lang="en-GB" dirty="0"/>
           </a:p>
         </p:txBody>
       </p:sp>
@@ -2461,7 +2463,7 @@
           <a:bodyPr/>
           <a:lstStyle/>
           <a:p>
-            <a:endParaRPr lang="en-GB"/>
+            <a:endParaRPr lang="en-GB" dirty="0"/>
           </a:p>
         </p:txBody>
       </p:sp>
@@ -2484,7 +2486,7 @@
               <a:rPr lang="en-GB" smtClean="0"/>
               <a:t>‹#›</a:t>
             </a:fld>
-            <a:endParaRPr lang="en-GB"/>
+            <a:endParaRPr lang="en-GB" dirty="0"/>
           </a:p>
         </p:txBody>
       </p:sp>
@@ -2653,9 +2655,9 @@
           <a:p>
             <a:fld id="{958A630C-F9C1-4722-A787-564B801DC51B}" type="datetimeFigureOut">
               <a:rPr lang="en-GB" smtClean="0"/>
-              <a:t>18/07/2017</a:t>
+              <a:t>21/11/2018</a:t>
             </a:fld>
-            <a:endParaRPr lang="en-GB"/>
+            <a:endParaRPr lang="en-GB" dirty="0"/>
           </a:p>
         </p:txBody>
       </p:sp>
@@ -2692,7 +2694,7 @@
             </a:lvl1pPr>
           </a:lstStyle>
           <a:p>
-            <a:endParaRPr lang="en-GB"/>
+            <a:endParaRPr lang="en-GB" dirty="0"/>
           </a:p>
         </p:txBody>
       </p:sp>
@@ -2733,7 +2735,7 @@
               <a:rPr lang="en-GB" smtClean="0"/>
               <a:t>‹#›</a:t>
             </a:fld>
-            <a:endParaRPr lang="en-GB"/>
+            <a:endParaRPr lang="en-GB" dirty="0"/>
           </a:p>
         </p:txBody>
       </p:sp>
@@ -3254,7 +3256,7 @@
           <a:bodyPr/>
           <a:lstStyle/>
           <a:p>
-            <a:endParaRPr lang="en-GB"/>
+            <a:endParaRPr lang="en-GB" dirty="0"/>
           </a:p>
         </p:txBody>
       </p:sp>
@@ -3273,7 +3275,7 @@
           <a:bodyPr/>
           <a:lstStyle/>
           <a:p>
-            <a:endParaRPr lang="en-GB"/>
+            <a:endParaRPr lang="en-GB" dirty="0"/>
           </a:p>
         </p:txBody>
       </p:sp>
@@ -4192,10 +4194,9 @@
           <a:p>
             <a:pPr algn="ctr"/>
             <a:r>
-              <a:rPr lang="en-US" sz="1000" dirty="0" err="1"/>
+              <a:rPr lang="en-US" sz="1000" dirty="0"/>
               <a:t>Summarisation</a:t>
             </a:r>
-            <a:endParaRPr lang="en-US" sz="1000" dirty="0"/>
           </a:p>
         </p:txBody>
       </p:sp>
@@ -4538,23 +4539,7 @@
             <a:pPr lvl="1"/>
             <a:r>
               <a:rPr lang="en-US" dirty="0"/>
-              <a:t>Mandatory Filtering (only extract </a:t>
-            </a:r>
-            <a:r>
-              <a:rPr lang="en-US" dirty="0" err="1"/>
-              <a:t>Tayside</a:t>
-            </a:r>
-            <a:r>
-              <a:rPr lang="en-US" dirty="0"/>
-              <a:t> and Fife </a:t>
-            </a:r>
-            <a:r>
-              <a:rPr lang="en-US" dirty="0" err="1"/>
-              <a:t>Healthboards</a:t>
-            </a:r>
-            <a:r>
-              <a:rPr lang="en-US" dirty="0"/>
-              <a:t>)</a:t>
+              <a:t>Mandatory Filtering (only extract Tayside and Fife Healthboards)</a:t>
             </a:r>
           </a:p>
           <a:p>
@@ -4567,12 +4552,8 @@
           <a:p>
             <a:pPr lvl="1"/>
             <a:r>
-              <a:rPr lang="en-US" dirty="0" err="1"/>
-              <a:t>Anonymisation</a:t>
-            </a:r>
-            <a:r>
               <a:rPr lang="en-US" dirty="0"/>
-              <a:t> Rules (project specific):</a:t>
+              <a:t>Anonymisation Rules (project specific):</a:t>
             </a:r>
           </a:p>
           <a:p>
@@ -4790,13 +4771,8 @@
           <a:p>
             <a:r>
               <a:rPr lang="en-US" dirty="0"/>
-              <a:t>Every Extraction, Data Load, Data Quality Engine run </a:t>
-            </a:r>
-            <a:r>
-              <a:rPr lang="en-US" dirty="0" err="1"/>
-              <a:t>etc</a:t>
-            </a:r>
-            <a:endParaRPr lang="en-US" dirty="0"/>
+              <a:t>Every Extraction, Data Load, Data Quality Engine run etc</a:t>
+            </a:r>
           </a:p>
           <a:p>
             <a:r>
@@ -4807,13 +4783,8 @@
           <a:p>
             <a:r>
               <a:rPr lang="en-US" dirty="0"/>
-              <a:t>Number of records extracted / loaded </a:t>
-            </a:r>
-            <a:r>
-              <a:rPr lang="en-US" dirty="0" err="1"/>
-              <a:t>etc</a:t>
-            </a:r>
-            <a:endParaRPr lang="en-US" dirty="0"/>
+              <a:t>Number of records extracted / loaded etc</a:t>
+            </a:r>
           </a:p>
           <a:p>
             <a:r>
@@ -5126,15 +5097,7 @@
           <a:p>
             <a:r>
               <a:rPr lang="en-US" dirty="0"/>
-              <a:t>CHI =&gt; </a:t>
-            </a:r>
-            <a:r>
-              <a:rPr lang="en-US" dirty="0" err="1"/>
-              <a:t>eDRIS</a:t>
-            </a:r>
-            <a:r>
-              <a:rPr lang="en-US" dirty="0"/>
-              <a:t> Identifier</a:t>
+              <a:t>CHI =&gt; eDRIS Identifier</a:t>
             </a:r>
             <a:endParaRPr lang="en-GB" dirty="0"/>
           </a:p>
@@ -6384,10 +6347,9 @@
           <a:p>
             <a:pPr algn="ctr"/>
             <a:r>
-              <a:rPr lang="en-US" sz="1000" dirty="0" err="1"/>
+              <a:rPr lang="en-US" sz="1000" dirty="0"/>
               <a:t>Summarisation</a:t>
             </a:r>
-            <a:endParaRPr lang="en-US" sz="1000" dirty="0"/>
           </a:p>
         </p:txBody>
       </p:sp>
@@ -6554,6 +6516,3003 @@
     <p:extLst>
       <p:ext uri="{BB962C8B-B14F-4D97-AF65-F5344CB8AC3E}">
         <p14:creationId xmlns:p14="http://schemas.microsoft.com/office/powerpoint/2010/main" val="2320404939"/>
+      </p:ext>
+    </p:extLst>
+  </p:cSld>
+  <p:clrMapOvr>
+    <a:masterClrMapping/>
+  </p:clrMapOvr>
+</p:sld>
+</file>
+
+<file path=ppt/slides/slide20.xml><?xml version="1.0" encoding="utf-8"?>
+<p:sld xmlns:a="http://schemas.openxmlformats.org/drawingml/2006/main" xmlns:r="http://schemas.openxmlformats.org/officeDocument/2006/relationships" xmlns:p="http://schemas.openxmlformats.org/presentationml/2006/main">
+  <p:cSld>
+    <p:spTree>
+      <p:nvGrpSpPr>
+        <p:cNvPr id="1" name=""/>
+        <p:cNvGrpSpPr/>
+        <p:nvPr/>
+      </p:nvGrpSpPr>
+      <p:grpSpPr>
+        <a:xfrm>
+          <a:off x="0" y="0"/>
+          <a:ext cx="0" cy="0"/>
+          <a:chOff x="0" y="0"/>
+          <a:chExt cx="0" cy="0"/>
+        </a:xfrm>
+      </p:grpSpPr>
+      <p:sp>
+        <p:nvSpPr>
+          <p:cNvPr id="9" name="Rectangle: Rounded Corners 8">
+            <a:extLst>
+              <a:ext uri="{FF2B5EF4-FFF2-40B4-BE49-F238E27FC236}">
+                <a16:creationId xmlns:a16="http://schemas.microsoft.com/office/drawing/2014/main" id="{91F52E7C-C0A6-4256-BCD3-54C42BC85936}"/>
+              </a:ext>
+            </a:extLst>
+          </p:cNvPr>
+          <p:cNvSpPr/>
+          <p:nvPr/>
+        </p:nvSpPr>
+        <p:spPr>
+          <a:xfrm>
+            <a:off x="-1737775" y="7125036"/>
+            <a:ext cx="1436914" cy="624114"/>
+          </a:xfrm>
+          <a:prstGeom prst="roundRect">
+            <a:avLst/>
+          </a:prstGeom>
+          <a:ln>
+            <a:noFill/>
+          </a:ln>
+          <a:effectLst>
+            <a:outerShdw blurRad="149987" dist="250190" dir="8460000" algn="ctr">
+              <a:srgbClr val="000000">
+                <a:alpha val="28000"/>
+              </a:srgbClr>
+            </a:outerShdw>
+          </a:effectLst>
+          <a:scene3d>
+            <a:camera prst="orthographicFront">
+              <a:rot lat="0" lon="0" rev="0"/>
+            </a:camera>
+            <a:lightRig rig="contrasting" dir="t">
+              <a:rot lat="0" lon="0" rev="1500000"/>
+            </a:lightRig>
+          </a:scene3d>
+          <a:sp3d prstMaterial="metal">
+            <a:bevelT w="88900" h="88900"/>
+          </a:sp3d>
+        </p:spPr>
+        <p:style>
+          <a:lnRef idx="2">
+            <a:schemeClr val="accent1">
+              <a:shade val="50000"/>
+            </a:schemeClr>
+          </a:lnRef>
+          <a:fillRef idx="1">
+            <a:schemeClr val="accent1"/>
+          </a:fillRef>
+          <a:effectRef idx="0">
+            <a:schemeClr val="accent1"/>
+          </a:effectRef>
+          <a:fontRef idx="minor">
+            <a:schemeClr val="lt1"/>
+          </a:fontRef>
+        </p:style>
+        <p:txBody>
+          <a:bodyPr rtlCol="0" anchor="ctr"/>
+          <a:lstStyle/>
+          <a:p>
+            <a:pPr algn="ctr"/>
+            <a:r>
+              <a:rPr lang="en-US" dirty="0"/>
+              <a:t>Column Info</a:t>
+            </a:r>
+            <a:endParaRPr lang="en-GB" dirty="0"/>
+          </a:p>
+        </p:txBody>
+      </p:sp>
+      <p:sp>
+        <p:nvSpPr>
+          <p:cNvPr id="10" name="Rectangle: Rounded Corners 9">
+            <a:extLst>
+              <a:ext uri="{FF2B5EF4-FFF2-40B4-BE49-F238E27FC236}">
+                <a16:creationId xmlns:a16="http://schemas.microsoft.com/office/drawing/2014/main" id="{582184EB-5E27-45A4-9EFF-0E980F170F4A}"/>
+              </a:ext>
+            </a:extLst>
+          </p:cNvPr>
+          <p:cNvSpPr/>
+          <p:nvPr/>
+        </p:nvSpPr>
+        <p:spPr>
+          <a:xfrm>
+            <a:off x="-2820580" y="5979795"/>
+            <a:ext cx="1436914" cy="624114"/>
+          </a:xfrm>
+          <a:prstGeom prst="roundRect">
+            <a:avLst/>
+          </a:prstGeom>
+          <a:ln>
+            <a:noFill/>
+          </a:ln>
+          <a:effectLst>
+            <a:outerShdw blurRad="149987" dist="250190" dir="8460000" algn="ctr">
+              <a:srgbClr val="000000">
+                <a:alpha val="28000"/>
+              </a:srgbClr>
+            </a:outerShdw>
+          </a:effectLst>
+          <a:scene3d>
+            <a:camera prst="orthographicFront">
+              <a:rot lat="0" lon="0" rev="0"/>
+            </a:camera>
+            <a:lightRig rig="contrasting" dir="t">
+              <a:rot lat="0" lon="0" rev="1500000"/>
+            </a:lightRig>
+          </a:scene3d>
+          <a:sp3d prstMaterial="metal">
+            <a:bevelT w="88900" h="88900"/>
+          </a:sp3d>
+        </p:spPr>
+        <p:style>
+          <a:lnRef idx="2">
+            <a:schemeClr val="accent1">
+              <a:shade val="50000"/>
+            </a:schemeClr>
+          </a:lnRef>
+          <a:fillRef idx="1">
+            <a:schemeClr val="accent1"/>
+          </a:fillRef>
+          <a:effectRef idx="0">
+            <a:schemeClr val="accent1"/>
+          </a:effectRef>
+          <a:fontRef idx="minor">
+            <a:schemeClr val="lt1"/>
+          </a:fontRef>
+        </p:style>
+        <p:txBody>
+          <a:bodyPr rtlCol="0" anchor="ctr"/>
+          <a:lstStyle/>
+          <a:p>
+            <a:pPr algn="ctr"/>
+            <a:r>
+              <a:rPr lang="en-US" dirty="0"/>
+              <a:t>Table Info</a:t>
+            </a:r>
+            <a:endParaRPr lang="en-GB" dirty="0"/>
+          </a:p>
+        </p:txBody>
+      </p:sp>
+      <p:cxnSp>
+        <p:nvCxnSpPr>
+          <p:cNvPr id="12" name="Straight Arrow Connector 11">
+            <a:extLst>
+              <a:ext uri="{FF2B5EF4-FFF2-40B4-BE49-F238E27FC236}">
+                <a16:creationId xmlns:a16="http://schemas.microsoft.com/office/drawing/2014/main" id="{1322B9A2-6B2C-4BAF-B784-B54EFC6D1176}"/>
+              </a:ext>
+            </a:extLst>
+          </p:cNvPr>
+          <p:cNvCxnSpPr>
+            <a:cxnSpLocks/>
+            <a:stCxn id="9" idx="0"/>
+            <a:endCxn id="10" idx="2"/>
+          </p:cNvCxnSpPr>
+          <p:nvPr/>
+        </p:nvCxnSpPr>
+        <p:spPr>
+          <a:xfrm flipH="1" flipV="1">
+            <a:off x="-2102123" y="6603909"/>
+            <a:ext cx="1082805" cy="521127"/>
+          </a:xfrm>
+          <a:prstGeom prst="straightConnector1">
+            <a:avLst/>
+          </a:prstGeom>
+          <a:ln w="57150">
+            <a:solidFill>
+              <a:srgbClr val="4472C4">
+                <a:alpha val="38039"/>
+              </a:srgbClr>
+            </a:solidFill>
+            <a:tailEnd type="triangle"/>
+          </a:ln>
+        </p:spPr>
+        <p:style>
+          <a:lnRef idx="3">
+            <a:schemeClr val="accent1"/>
+          </a:lnRef>
+          <a:fillRef idx="0">
+            <a:schemeClr val="accent1"/>
+          </a:fillRef>
+          <a:effectRef idx="2">
+            <a:schemeClr val="accent1"/>
+          </a:effectRef>
+          <a:fontRef idx="minor">
+            <a:schemeClr val="tx1"/>
+          </a:fontRef>
+        </p:style>
+      </p:cxnSp>
+      <p:sp>
+        <p:nvSpPr>
+          <p:cNvPr id="26" name="Rectangle: Rounded Corners 25">
+            <a:extLst>
+              <a:ext uri="{FF2B5EF4-FFF2-40B4-BE49-F238E27FC236}">
+                <a16:creationId xmlns:a16="http://schemas.microsoft.com/office/drawing/2014/main" id="{674477E9-CE2D-4CE2-BBCF-ADCF259FC3BB}"/>
+              </a:ext>
+            </a:extLst>
+          </p:cNvPr>
+          <p:cNvSpPr/>
+          <p:nvPr/>
+        </p:nvSpPr>
+        <p:spPr>
+          <a:xfrm>
+            <a:off x="-3293247" y="7118549"/>
+            <a:ext cx="1436914" cy="624114"/>
+          </a:xfrm>
+          <a:prstGeom prst="roundRect">
+            <a:avLst/>
+          </a:prstGeom>
+          <a:ln>
+            <a:noFill/>
+          </a:ln>
+          <a:effectLst>
+            <a:outerShdw blurRad="149987" dist="250190" dir="8460000" algn="ctr">
+              <a:srgbClr val="000000">
+                <a:alpha val="28000"/>
+              </a:srgbClr>
+            </a:outerShdw>
+          </a:effectLst>
+          <a:scene3d>
+            <a:camera prst="orthographicFront">
+              <a:rot lat="0" lon="0" rev="0"/>
+            </a:camera>
+            <a:lightRig rig="contrasting" dir="t">
+              <a:rot lat="0" lon="0" rev="1500000"/>
+            </a:lightRig>
+          </a:scene3d>
+          <a:sp3d prstMaterial="metal">
+            <a:bevelT w="88900" h="88900"/>
+          </a:sp3d>
+        </p:spPr>
+        <p:style>
+          <a:lnRef idx="2">
+            <a:schemeClr val="accent1">
+              <a:shade val="50000"/>
+            </a:schemeClr>
+          </a:lnRef>
+          <a:fillRef idx="1">
+            <a:schemeClr val="accent1"/>
+          </a:fillRef>
+          <a:effectRef idx="0">
+            <a:schemeClr val="accent1"/>
+          </a:effectRef>
+          <a:fontRef idx="minor">
+            <a:schemeClr val="lt1"/>
+          </a:fontRef>
+        </p:style>
+        <p:txBody>
+          <a:bodyPr rtlCol="0" anchor="ctr"/>
+          <a:lstStyle/>
+          <a:p>
+            <a:pPr algn="ctr"/>
+            <a:r>
+              <a:rPr lang="en-US" dirty="0"/>
+              <a:t>Column Info</a:t>
+            </a:r>
+            <a:endParaRPr lang="en-GB" dirty="0"/>
+          </a:p>
+        </p:txBody>
+      </p:sp>
+      <p:cxnSp>
+        <p:nvCxnSpPr>
+          <p:cNvPr id="31" name="Straight Arrow Connector 30">
+            <a:extLst>
+              <a:ext uri="{FF2B5EF4-FFF2-40B4-BE49-F238E27FC236}">
+                <a16:creationId xmlns:a16="http://schemas.microsoft.com/office/drawing/2014/main" id="{AAEC1AFC-17F6-4C38-A859-0C1E02B1DAB0}"/>
+              </a:ext>
+            </a:extLst>
+          </p:cNvPr>
+          <p:cNvCxnSpPr>
+            <a:cxnSpLocks/>
+            <a:stCxn id="26" idx="0"/>
+            <a:endCxn id="10" idx="2"/>
+          </p:cNvCxnSpPr>
+          <p:nvPr/>
+        </p:nvCxnSpPr>
+        <p:spPr>
+          <a:xfrm flipV="1">
+            <a:off x="-2574790" y="6603909"/>
+            <a:ext cx="472667" cy="514640"/>
+          </a:xfrm>
+          <a:prstGeom prst="straightConnector1">
+            <a:avLst/>
+          </a:prstGeom>
+          <a:ln w="57150">
+            <a:solidFill>
+              <a:srgbClr val="4472C4">
+                <a:alpha val="38039"/>
+              </a:srgbClr>
+            </a:solidFill>
+            <a:tailEnd type="triangle"/>
+          </a:ln>
+        </p:spPr>
+        <p:style>
+          <a:lnRef idx="3">
+            <a:schemeClr val="accent1"/>
+          </a:lnRef>
+          <a:fillRef idx="0">
+            <a:schemeClr val="accent1"/>
+          </a:fillRef>
+          <a:effectRef idx="2">
+            <a:schemeClr val="accent1"/>
+          </a:effectRef>
+          <a:fontRef idx="minor">
+            <a:schemeClr val="tx1"/>
+          </a:fontRef>
+        </p:style>
+      </p:cxnSp>
+      <p:sp>
+        <p:nvSpPr>
+          <p:cNvPr id="35" name="Rectangle: Rounded Corners 34">
+            <a:extLst>
+              <a:ext uri="{FF2B5EF4-FFF2-40B4-BE49-F238E27FC236}">
+                <a16:creationId xmlns:a16="http://schemas.microsoft.com/office/drawing/2014/main" id="{440AA481-D041-46DF-814A-0584132EE787}"/>
+              </a:ext>
+            </a:extLst>
+          </p:cNvPr>
+          <p:cNvSpPr/>
+          <p:nvPr/>
+        </p:nvSpPr>
+        <p:spPr>
+          <a:xfrm>
+            <a:off x="-1054337" y="4686552"/>
+            <a:ext cx="2430969" cy="624114"/>
+          </a:xfrm>
+          <a:prstGeom prst="roundRect">
+            <a:avLst/>
+          </a:prstGeom>
+          <a:ln>
+            <a:noFill/>
+          </a:ln>
+          <a:effectLst>
+            <a:outerShdw blurRad="149987" dist="250190" dir="8460000" algn="ctr">
+              <a:srgbClr val="000000">
+                <a:alpha val="28000"/>
+              </a:srgbClr>
+            </a:outerShdw>
+          </a:effectLst>
+          <a:scene3d>
+            <a:camera prst="orthographicFront">
+              <a:rot lat="0" lon="0" rev="0"/>
+            </a:camera>
+            <a:lightRig rig="contrasting" dir="t">
+              <a:rot lat="0" lon="0" rev="1500000"/>
+            </a:lightRig>
+          </a:scene3d>
+          <a:sp3d prstMaterial="metal">
+            <a:bevelT w="88900" h="88900"/>
+          </a:sp3d>
+        </p:spPr>
+        <p:style>
+          <a:lnRef idx="2">
+            <a:schemeClr val="accent1">
+              <a:shade val="50000"/>
+            </a:schemeClr>
+          </a:lnRef>
+          <a:fillRef idx="1">
+            <a:schemeClr val="accent1"/>
+          </a:fillRef>
+          <a:effectRef idx="0">
+            <a:schemeClr val="accent1"/>
+          </a:effectRef>
+          <a:fontRef idx="minor">
+            <a:schemeClr val="lt1"/>
+          </a:fontRef>
+        </p:style>
+        <p:txBody>
+          <a:bodyPr rtlCol="0" anchor="ctr"/>
+          <a:lstStyle/>
+          <a:p>
+            <a:pPr algn="ctr"/>
+            <a:r>
+              <a:rPr lang="en-US" dirty="0"/>
+              <a:t>Extraction Information</a:t>
+            </a:r>
+            <a:endParaRPr lang="en-GB" dirty="0"/>
+          </a:p>
+        </p:txBody>
+      </p:sp>
+      <p:cxnSp>
+        <p:nvCxnSpPr>
+          <p:cNvPr id="36" name="Straight Arrow Connector 35">
+            <a:extLst>
+              <a:ext uri="{FF2B5EF4-FFF2-40B4-BE49-F238E27FC236}">
+                <a16:creationId xmlns:a16="http://schemas.microsoft.com/office/drawing/2014/main" id="{C97E7B3A-21F3-4B68-9ED2-82E05CFFBD15}"/>
+              </a:ext>
+            </a:extLst>
+          </p:cNvPr>
+          <p:cNvCxnSpPr>
+            <a:cxnSpLocks/>
+            <a:stCxn id="9" idx="0"/>
+            <a:endCxn id="35" idx="2"/>
+          </p:cNvCxnSpPr>
+          <p:nvPr/>
+        </p:nvCxnSpPr>
+        <p:spPr>
+          <a:xfrm flipV="1">
+            <a:off x="-1019318" y="5310666"/>
+            <a:ext cx="1180466" cy="1814370"/>
+          </a:xfrm>
+          <a:prstGeom prst="straightConnector1">
+            <a:avLst/>
+          </a:prstGeom>
+          <a:ln w="57150">
+            <a:solidFill>
+              <a:srgbClr val="4472C4">
+                <a:alpha val="38039"/>
+              </a:srgbClr>
+            </a:solidFill>
+            <a:tailEnd type="triangle"/>
+          </a:ln>
+        </p:spPr>
+        <p:style>
+          <a:lnRef idx="3">
+            <a:schemeClr val="accent1"/>
+          </a:lnRef>
+          <a:fillRef idx="0">
+            <a:schemeClr val="accent1"/>
+          </a:fillRef>
+          <a:effectRef idx="2">
+            <a:schemeClr val="accent1"/>
+          </a:effectRef>
+          <a:fontRef idx="minor">
+            <a:schemeClr val="tx1"/>
+          </a:fontRef>
+        </p:style>
+      </p:cxnSp>
+      <p:cxnSp>
+        <p:nvCxnSpPr>
+          <p:cNvPr id="40" name="Straight Arrow Connector 39">
+            <a:extLst>
+              <a:ext uri="{FF2B5EF4-FFF2-40B4-BE49-F238E27FC236}">
+                <a16:creationId xmlns:a16="http://schemas.microsoft.com/office/drawing/2014/main" id="{C813BAC7-6A28-4A86-904D-33D5B045AB67}"/>
+              </a:ext>
+            </a:extLst>
+          </p:cNvPr>
+          <p:cNvCxnSpPr>
+            <a:cxnSpLocks/>
+            <a:stCxn id="44" idx="1"/>
+            <a:endCxn id="35" idx="2"/>
+          </p:cNvCxnSpPr>
+          <p:nvPr/>
+        </p:nvCxnSpPr>
+        <p:spPr>
+          <a:xfrm flipH="1" flipV="1">
+            <a:off x="161148" y="5310666"/>
+            <a:ext cx="4507791" cy="1979806"/>
+          </a:xfrm>
+          <a:prstGeom prst="straightConnector1">
+            <a:avLst/>
+          </a:prstGeom>
+          <a:ln w="57150">
+            <a:solidFill>
+              <a:srgbClr val="4472C4">
+                <a:alpha val="38039"/>
+              </a:srgbClr>
+            </a:solidFill>
+            <a:tailEnd type="triangle"/>
+          </a:ln>
+        </p:spPr>
+        <p:style>
+          <a:lnRef idx="3">
+            <a:schemeClr val="accent1"/>
+          </a:lnRef>
+          <a:fillRef idx="0">
+            <a:schemeClr val="accent1"/>
+          </a:fillRef>
+          <a:effectRef idx="2">
+            <a:schemeClr val="accent1"/>
+          </a:effectRef>
+          <a:fontRef idx="minor">
+            <a:schemeClr val="tx1"/>
+          </a:fontRef>
+        </p:style>
+      </p:cxnSp>
+      <p:sp>
+        <p:nvSpPr>
+          <p:cNvPr id="44" name="Rectangle: Rounded Corners 43">
+            <a:extLst>
+              <a:ext uri="{FF2B5EF4-FFF2-40B4-BE49-F238E27FC236}">
+                <a16:creationId xmlns:a16="http://schemas.microsoft.com/office/drawing/2014/main" id="{9E9178D0-F259-4907-AA4E-9D2CE89BDE31}"/>
+              </a:ext>
+            </a:extLst>
+          </p:cNvPr>
+          <p:cNvSpPr/>
+          <p:nvPr/>
+        </p:nvSpPr>
+        <p:spPr>
+          <a:xfrm>
+            <a:off x="4668939" y="6978415"/>
+            <a:ext cx="2430969" cy="624114"/>
+          </a:xfrm>
+          <a:prstGeom prst="roundRect">
+            <a:avLst/>
+          </a:prstGeom>
+          <a:ln>
+            <a:noFill/>
+          </a:ln>
+          <a:effectLst>
+            <a:outerShdw blurRad="149987" dist="250190" dir="8460000" algn="ctr">
+              <a:srgbClr val="000000">
+                <a:alpha val="28000"/>
+              </a:srgbClr>
+            </a:outerShdw>
+          </a:effectLst>
+          <a:scene3d>
+            <a:camera prst="orthographicFront">
+              <a:rot lat="0" lon="0" rev="0"/>
+            </a:camera>
+            <a:lightRig rig="contrasting" dir="t">
+              <a:rot lat="0" lon="0" rev="1500000"/>
+            </a:lightRig>
+          </a:scene3d>
+          <a:sp3d prstMaterial="metal">
+            <a:bevelT w="88900" h="88900"/>
+          </a:sp3d>
+        </p:spPr>
+        <p:style>
+          <a:lnRef idx="2">
+            <a:schemeClr val="accent1">
+              <a:shade val="50000"/>
+            </a:schemeClr>
+          </a:lnRef>
+          <a:fillRef idx="1">
+            <a:schemeClr val="accent1"/>
+          </a:fillRef>
+          <a:effectRef idx="0">
+            <a:schemeClr val="accent1"/>
+          </a:effectRef>
+          <a:fontRef idx="minor">
+            <a:schemeClr val="lt1"/>
+          </a:fontRef>
+        </p:style>
+        <p:txBody>
+          <a:bodyPr rtlCol="0" anchor="ctr"/>
+          <a:lstStyle/>
+          <a:p>
+            <a:pPr algn="ctr"/>
+            <a:r>
+              <a:rPr lang="en-US" dirty="0"/>
+              <a:t>Extraction Filter</a:t>
+            </a:r>
+            <a:endParaRPr lang="en-GB" dirty="0"/>
+          </a:p>
+        </p:txBody>
+      </p:sp>
+      <p:sp>
+        <p:nvSpPr>
+          <p:cNvPr id="48" name="TextBox 47">
+            <a:extLst>
+              <a:ext uri="{FF2B5EF4-FFF2-40B4-BE49-F238E27FC236}">
+                <a16:creationId xmlns:a16="http://schemas.microsoft.com/office/drawing/2014/main" id="{50F10069-25DE-4500-BE13-7E1456066969}"/>
+              </a:ext>
+            </a:extLst>
+          </p:cNvPr>
+          <p:cNvSpPr txBox="1"/>
+          <p:nvPr/>
+        </p:nvSpPr>
+        <p:spPr>
+          <a:xfrm>
+            <a:off x="7123709" y="6978415"/>
+            <a:ext cx="3197991" cy="1200329"/>
+          </a:xfrm>
+          <a:prstGeom prst="rect">
+            <a:avLst/>
+          </a:prstGeom>
+          <a:noFill/>
+          <a:ln>
+            <a:noFill/>
+          </a:ln>
+          <a:effectLst>
+            <a:outerShdw blurRad="149987" dist="250190" dir="8460000" algn="ctr">
+              <a:srgbClr val="000000">
+                <a:alpha val="28000"/>
+              </a:srgbClr>
+            </a:outerShdw>
+          </a:effectLst>
+          <a:scene3d>
+            <a:camera prst="orthographicFront">
+              <a:rot lat="0" lon="0" rev="0"/>
+            </a:camera>
+            <a:lightRig rig="contrasting" dir="t">
+              <a:rot lat="0" lon="0" rev="1500000"/>
+            </a:lightRig>
+          </a:scene3d>
+          <a:sp3d prstMaterial="metal">
+            <a:bevelT w="88900" h="88900"/>
+          </a:sp3d>
+        </p:spPr>
+        <p:txBody>
+          <a:bodyPr wrap="square" rtlCol="0">
+            <a:spAutoFit/>
+          </a:bodyPr>
+          <a:lstStyle/>
+          <a:p>
+            <a:pPr marL="285750" indent="-285750">
+              <a:buFont typeface="Arial" panose="020B0604020202020204" pitchFamily="34" charset="0"/>
+              <a:buChar char="•"/>
+            </a:pPr>
+            <a:r>
+              <a:rPr lang="en-US" dirty="0"/>
+              <a:t>How to use the column reduce the dataset (e.g</a:t>
+            </a:r>
+            <a:r>
+              <a:rPr lang="en-US"/>
+              <a:t>. </a:t>
+            </a:r>
+            <a:r>
+              <a:rPr lang="en-GB" dirty="0"/>
+              <a:t>Health board is ‘Tayside’)</a:t>
+            </a:r>
+          </a:p>
+          <a:p>
+            <a:pPr marL="285750" indent="-285750">
+              <a:buFont typeface="Arial" panose="020B0604020202020204" pitchFamily="34" charset="0"/>
+              <a:buChar char="•"/>
+            </a:pPr>
+            <a:r>
+              <a:rPr lang="en-US" dirty="0"/>
+              <a:t>Human readable description</a:t>
+            </a:r>
+          </a:p>
+        </p:txBody>
+      </p:sp>
+      <p:sp>
+        <p:nvSpPr>
+          <p:cNvPr id="51" name="Rectangle: Rounded Corners 50">
+            <a:extLst>
+              <a:ext uri="{FF2B5EF4-FFF2-40B4-BE49-F238E27FC236}">
+                <a16:creationId xmlns:a16="http://schemas.microsoft.com/office/drawing/2014/main" id="{64B18CCD-4031-47FD-8A3D-0423FD652748}"/>
+              </a:ext>
+            </a:extLst>
+          </p:cNvPr>
+          <p:cNvSpPr/>
+          <p:nvPr/>
+        </p:nvSpPr>
+        <p:spPr>
+          <a:xfrm>
+            <a:off x="-1057335" y="3429000"/>
+            <a:ext cx="2430969" cy="624114"/>
+          </a:xfrm>
+          <a:prstGeom prst="roundRect">
+            <a:avLst/>
+          </a:prstGeom>
+          <a:ln>
+            <a:noFill/>
+          </a:ln>
+          <a:effectLst>
+            <a:outerShdw blurRad="149987" dist="250190" dir="8460000" algn="ctr">
+              <a:srgbClr val="000000">
+                <a:alpha val="28000"/>
+              </a:srgbClr>
+            </a:outerShdw>
+          </a:effectLst>
+          <a:scene3d>
+            <a:camera prst="orthographicFront">
+              <a:rot lat="0" lon="0" rev="0"/>
+            </a:camera>
+            <a:lightRig rig="contrasting" dir="t">
+              <a:rot lat="0" lon="0" rev="1500000"/>
+            </a:lightRig>
+          </a:scene3d>
+          <a:sp3d prstMaterial="metal">
+            <a:bevelT w="88900" h="88900"/>
+          </a:sp3d>
+        </p:spPr>
+        <p:style>
+          <a:lnRef idx="2">
+            <a:schemeClr val="accent1">
+              <a:shade val="50000"/>
+            </a:schemeClr>
+          </a:lnRef>
+          <a:fillRef idx="1">
+            <a:schemeClr val="accent1"/>
+          </a:fillRef>
+          <a:effectRef idx="0">
+            <a:schemeClr val="accent1"/>
+          </a:effectRef>
+          <a:fontRef idx="minor">
+            <a:schemeClr val="lt1"/>
+          </a:fontRef>
+        </p:style>
+        <p:txBody>
+          <a:bodyPr rtlCol="0" anchor="ctr"/>
+          <a:lstStyle/>
+          <a:p>
+            <a:pPr algn="ctr"/>
+            <a:r>
+              <a:rPr lang="en-US" dirty="0"/>
+              <a:t>Catalogue Item</a:t>
+            </a:r>
+            <a:endParaRPr lang="en-GB" dirty="0"/>
+          </a:p>
+        </p:txBody>
+      </p:sp>
+      <p:cxnSp>
+        <p:nvCxnSpPr>
+          <p:cNvPr id="52" name="Straight Arrow Connector 51">
+            <a:extLst>
+              <a:ext uri="{FF2B5EF4-FFF2-40B4-BE49-F238E27FC236}">
+                <a16:creationId xmlns:a16="http://schemas.microsoft.com/office/drawing/2014/main" id="{C7ABE694-C334-44AD-88B8-709E5AF62119}"/>
+              </a:ext>
+            </a:extLst>
+          </p:cNvPr>
+          <p:cNvCxnSpPr>
+            <a:cxnSpLocks/>
+            <a:stCxn id="35" idx="0"/>
+            <a:endCxn id="51" idx="2"/>
+          </p:cNvCxnSpPr>
+          <p:nvPr/>
+        </p:nvCxnSpPr>
+        <p:spPr>
+          <a:xfrm flipH="1" flipV="1">
+            <a:off x="158150" y="4053114"/>
+            <a:ext cx="2998" cy="633438"/>
+          </a:xfrm>
+          <a:prstGeom prst="straightConnector1">
+            <a:avLst/>
+          </a:prstGeom>
+          <a:ln w="57150">
+            <a:solidFill>
+              <a:srgbClr val="4472C4">
+                <a:alpha val="36863"/>
+              </a:srgbClr>
+            </a:solidFill>
+            <a:tailEnd type="triangle"/>
+          </a:ln>
+        </p:spPr>
+        <p:style>
+          <a:lnRef idx="3">
+            <a:schemeClr val="accent1"/>
+          </a:lnRef>
+          <a:fillRef idx="0">
+            <a:schemeClr val="accent1"/>
+          </a:fillRef>
+          <a:effectRef idx="2">
+            <a:schemeClr val="accent1"/>
+          </a:effectRef>
+          <a:fontRef idx="minor">
+            <a:schemeClr val="tx1"/>
+          </a:fontRef>
+        </p:style>
+      </p:cxnSp>
+      <p:sp>
+        <p:nvSpPr>
+          <p:cNvPr id="55" name="TextBox 54">
+            <a:extLst>
+              <a:ext uri="{FF2B5EF4-FFF2-40B4-BE49-F238E27FC236}">
+                <a16:creationId xmlns:a16="http://schemas.microsoft.com/office/drawing/2014/main" id="{BDD7482B-06DD-4FC0-885B-F48875A8B30F}"/>
+              </a:ext>
+            </a:extLst>
+          </p:cNvPr>
+          <p:cNvSpPr txBox="1"/>
+          <p:nvPr/>
+        </p:nvSpPr>
+        <p:spPr>
+          <a:xfrm>
+            <a:off x="1404442" y="3556391"/>
+            <a:ext cx="3197991" cy="369332"/>
+          </a:xfrm>
+          <a:prstGeom prst="rect">
+            <a:avLst/>
+          </a:prstGeom>
+          <a:noFill/>
+          <a:ln>
+            <a:noFill/>
+          </a:ln>
+          <a:effectLst>
+            <a:outerShdw blurRad="149987" dist="250190" dir="8460000" algn="ctr">
+              <a:srgbClr val="000000">
+                <a:alpha val="28000"/>
+              </a:srgbClr>
+            </a:outerShdw>
+          </a:effectLst>
+          <a:scene3d>
+            <a:camera prst="orthographicFront">
+              <a:rot lat="0" lon="0" rev="0"/>
+            </a:camera>
+            <a:lightRig rig="contrasting" dir="t">
+              <a:rot lat="0" lon="0" rev="1500000"/>
+            </a:lightRig>
+          </a:scene3d>
+          <a:sp3d prstMaterial="metal">
+            <a:bevelT w="88900" h="88900"/>
+          </a:sp3d>
+        </p:spPr>
+        <p:txBody>
+          <a:bodyPr wrap="square" rtlCol="0">
+            <a:spAutoFit/>
+          </a:bodyPr>
+          <a:lstStyle/>
+          <a:p>
+            <a:pPr marL="285750" indent="-285750">
+              <a:buFont typeface="Arial" panose="020B0604020202020204" pitchFamily="34" charset="0"/>
+              <a:buChar char="•"/>
+            </a:pPr>
+            <a:r>
+              <a:rPr lang="en-US" dirty="0"/>
+              <a:t>Human readable description</a:t>
+            </a:r>
+            <a:endParaRPr lang="en-GB" dirty="0"/>
+          </a:p>
+        </p:txBody>
+      </p:sp>
+      <p:sp>
+        <p:nvSpPr>
+          <p:cNvPr id="56" name="Rectangle: Rounded Corners 55">
+            <a:extLst>
+              <a:ext uri="{FF2B5EF4-FFF2-40B4-BE49-F238E27FC236}">
+                <a16:creationId xmlns:a16="http://schemas.microsoft.com/office/drawing/2014/main" id="{0DDFAA31-080B-4573-B806-395A4731EA83}"/>
+              </a:ext>
+            </a:extLst>
+          </p:cNvPr>
+          <p:cNvSpPr/>
+          <p:nvPr/>
+        </p:nvSpPr>
+        <p:spPr>
+          <a:xfrm>
+            <a:off x="-1057335" y="2360776"/>
+            <a:ext cx="2430969" cy="624114"/>
+          </a:xfrm>
+          <a:prstGeom prst="roundRect">
+            <a:avLst/>
+          </a:prstGeom>
+          <a:ln>
+            <a:noFill/>
+          </a:ln>
+          <a:effectLst>
+            <a:outerShdw blurRad="149987" dist="250190" dir="8460000" algn="ctr">
+              <a:srgbClr val="000000">
+                <a:alpha val="28000"/>
+              </a:srgbClr>
+            </a:outerShdw>
+          </a:effectLst>
+          <a:scene3d>
+            <a:camera prst="orthographicFront">
+              <a:rot lat="0" lon="0" rev="0"/>
+            </a:camera>
+            <a:lightRig rig="contrasting" dir="t">
+              <a:rot lat="0" lon="0" rev="1500000"/>
+            </a:lightRig>
+          </a:scene3d>
+          <a:sp3d prstMaterial="metal">
+            <a:bevelT w="88900" h="88900"/>
+          </a:sp3d>
+        </p:spPr>
+        <p:style>
+          <a:lnRef idx="2">
+            <a:schemeClr val="accent1">
+              <a:shade val="50000"/>
+            </a:schemeClr>
+          </a:lnRef>
+          <a:fillRef idx="1">
+            <a:schemeClr val="accent1"/>
+          </a:fillRef>
+          <a:effectRef idx="0">
+            <a:schemeClr val="accent1"/>
+          </a:effectRef>
+          <a:fontRef idx="minor">
+            <a:schemeClr val="lt1"/>
+          </a:fontRef>
+        </p:style>
+        <p:txBody>
+          <a:bodyPr rtlCol="0" anchor="ctr"/>
+          <a:lstStyle/>
+          <a:p>
+            <a:pPr algn="ctr"/>
+            <a:r>
+              <a:rPr lang="en-US" dirty="0"/>
+              <a:t>Catalogue</a:t>
+            </a:r>
+            <a:endParaRPr lang="en-GB" dirty="0"/>
+          </a:p>
+        </p:txBody>
+      </p:sp>
+      <p:sp>
+        <p:nvSpPr>
+          <p:cNvPr id="57" name="TextBox 56">
+            <a:extLst>
+              <a:ext uri="{FF2B5EF4-FFF2-40B4-BE49-F238E27FC236}">
+                <a16:creationId xmlns:a16="http://schemas.microsoft.com/office/drawing/2014/main" id="{ED3BF6A0-F0A2-434C-9F32-34BE991BD87E}"/>
+              </a:ext>
+            </a:extLst>
+          </p:cNvPr>
+          <p:cNvSpPr txBox="1"/>
+          <p:nvPr/>
+        </p:nvSpPr>
+        <p:spPr>
+          <a:xfrm>
+            <a:off x="1404442" y="2488167"/>
+            <a:ext cx="3197991" cy="646331"/>
+          </a:xfrm>
+          <a:prstGeom prst="rect">
+            <a:avLst/>
+          </a:prstGeom>
+          <a:noFill/>
+          <a:ln>
+            <a:noFill/>
+          </a:ln>
+          <a:effectLst>
+            <a:outerShdw blurRad="149987" dist="250190" dir="8460000" algn="ctr">
+              <a:srgbClr val="000000">
+                <a:alpha val="28000"/>
+              </a:srgbClr>
+            </a:outerShdw>
+          </a:effectLst>
+          <a:scene3d>
+            <a:camera prst="orthographicFront">
+              <a:rot lat="0" lon="0" rev="0"/>
+            </a:camera>
+            <a:lightRig rig="contrasting" dir="t">
+              <a:rot lat="0" lon="0" rev="1500000"/>
+            </a:lightRig>
+          </a:scene3d>
+          <a:sp3d prstMaterial="metal">
+            <a:bevelT w="88900" h="88900"/>
+          </a:sp3d>
+        </p:spPr>
+        <p:txBody>
+          <a:bodyPr wrap="square" rtlCol="0">
+            <a:spAutoFit/>
+          </a:bodyPr>
+          <a:lstStyle/>
+          <a:p>
+            <a:pPr marL="285750" indent="-285750">
+              <a:buFont typeface="Arial" panose="020B0604020202020204" pitchFamily="34" charset="0"/>
+              <a:buChar char="•"/>
+            </a:pPr>
+            <a:r>
+              <a:rPr lang="en-US" dirty="0"/>
+              <a:t>Human readable description</a:t>
+            </a:r>
+          </a:p>
+          <a:p>
+            <a:pPr marL="285750" indent="-285750">
+              <a:buFont typeface="Arial" panose="020B0604020202020204" pitchFamily="34" charset="0"/>
+              <a:buChar char="•"/>
+            </a:pPr>
+            <a:r>
+              <a:rPr lang="en-US" dirty="0"/>
+              <a:t>Validation rules</a:t>
+            </a:r>
+          </a:p>
+        </p:txBody>
+      </p:sp>
+      <p:cxnSp>
+        <p:nvCxnSpPr>
+          <p:cNvPr id="58" name="Straight Arrow Connector 57">
+            <a:extLst>
+              <a:ext uri="{FF2B5EF4-FFF2-40B4-BE49-F238E27FC236}">
+                <a16:creationId xmlns:a16="http://schemas.microsoft.com/office/drawing/2014/main" id="{9B1C8B07-6654-4FF5-A1AA-D8C6440581EA}"/>
+              </a:ext>
+            </a:extLst>
+          </p:cNvPr>
+          <p:cNvCxnSpPr>
+            <a:cxnSpLocks/>
+            <a:stCxn id="51" idx="0"/>
+            <a:endCxn id="56" idx="2"/>
+          </p:cNvCxnSpPr>
+          <p:nvPr/>
+        </p:nvCxnSpPr>
+        <p:spPr>
+          <a:xfrm flipV="1">
+            <a:off x="158150" y="2984890"/>
+            <a:ext cx="0" cy="444110"/>
+          </a:xfrm>
+          <a:prstGeom prst="straightConnector1">
+            <a:avLst/>
+          </a:prstGeom>
+          <a:ln w="57150">
+            <a:solidFill>
+              <a:srgbClr val="4472C4">
+                <a:alpha val="36863"/>
+              </a:srgbClr>
+            </a:solidFill>
+            <a:tailEnd type="triangle"/>
+          </a:ln>
+        </p:spPr>
+        <p:style>
+          <a:lnRef idx="3">
+            <a:schemeClr val="accent1"/>
+          </a:lnRef>
+          <a:fillRef idx="0">
+            <a:schemeClr val="accent1"/>
+          </a:fillRef>
+          <a:effectRef idx="2">
+            <a:schemeClr val="accent1"/>
+          </a:effectRef>
+          <a:fontRef idx="minor">
+            <a:schemeClr val="tx1"/>
+          </a:fontRef>
+        </p:style>
+      </p:cxnSp>
+      <p:sp>
+        <p:nvSpPr>
+          <p:cNvPr id="62" name="Rectangle: Rounded Corners 61">
+            <a:extLst>
+              <a:ext uri="{FF2B5EF4-FFF2-40B4-BE49-F238E27FC236}">
+                <a16:creationId xmlns:a16="http://schemas.microsoft.com/office/drawing/2014/main" id="{70E2D112-B51F-481D-9340-F68E9F059478}"/>
+              </a:ext>
+            </a:extLst>
+          </p:cNvPr>
+          <p:cNvSpPr/>
+          <p:nvPr/>
+        </p:nvSpPr>
+        <p:spPr>
+          <a:xfrm>
+            <a:off x="-7229994" y="2360776"/>
+            <a:ext cx="2430969" cy="624114"/>
+          </a:xfrm>
+          <a:prstGeom prst="roundRect">
+            <a:avLst/>
+          </a:prstGeom>
+          <a:ln>
+            <a:noFill/>
+          </a:ln>
+          <a:effectLst>
+            <a:outerShdw blurRad="149987" dist="250190" dir="8460000" algn="ctr">
+              <a:srgbClr val="000000">
+                <a:alpha val="28000"/>
+              </a:srgbClr>
+            </a:outerShdw>
+          </a:effectLst>
+          <a:scene3d>
+            <a:camera prst="orthographicFront">
+              <a:rot lat="0" lon="0" rev="0"/>
+            </a:camera>
+            <a:lightRig rig="contrasting" dir="t">
+              <a:rot lat="0" lon="0" rev="1500000"/>
+            </a:lightRig>
+          </a:scene3d>
+          <a:sp3d prstMaterial="metal">
+            <a:bevelT w="88900" h="88900"/>
+          </a:sp3d>
+        </p:spPr>
+        <p:style>
+          <a:lnRef idx="2">
+            <a:schemeClr val="accent1">
+              <a:shade val="50000"/>
+            </a:schemeClr>
+          </a:lnRef>
+          <a:fillRef idx="1">
+            <a:schemeClr val="accent1"/>
+          </a:fillRef>
+          <a:effectRef idx="0">
+            <a:schemeClr val="accent1"/>
+          </a:effectRef>
+          <a:fontRef idx="minor">
+            <a:schemeClr val="lt1"/>
+          </a:fontRef>
+        </p:style>
+        <p:txBody>
+          <a:bodyPr rtlCol="0" anchor="ctr"/>
+          <a:lstStyle/>
+          <a:p>
+            <a:pPr algn="ctr"/>
+            <a:r>
+              <a:rPr lang="en-US" dirty="0"/>
+              <a:t>Load Metadata</a:t>
+            </a:r>
+            <a:endParaRPr lang="en-GB" dirty="0"/>
+          </a:p>
+        </p:txBody>
+      </p:sp>
+      <p:cxnSp>
+        <p:nvCxnSpPr>
+          <p:cNvPr id="63" name="Straight Arrow Connector 62">
+            <a:extLst>
+              <a:ext uri="{FF2B5EF4-FFF2-40B4-BE49-F238E27FC236}">
+                <a16:creationId xmlns:a16="http://schemas.microsoft.com/office/drawing/2014/main" id="{D74F2360-E196-4624-9B79-BE1965B38F97}"/>
+              </a:ext>
+            </a:extLst>
+          </p:cNvPr>
+          <p:cNvCxnSpPr>
+            <a:cxnSpLocks/>
+            <a:stCxn id="56" idx="1"/>
+            <a:endCxn id="62" idx="3"/>
+          </p:cNvCxnSpPr>
+          <p:nvPr/>
+        </p:nvCxnSpPr>
+        <p:spPr>
+          <a:xfrm flipH="1">
+            <a:off x="-4799025" y="2672833"/>
+            <a:ext cx="3741690" cy="0"/>
+          </a:xfrm>
+          <a:prstGeom prst="straightConnector1">
+            <a:avLst/>
+          </a:prstGeom>
+          <a:ln w="57150">
+            <a:solidFill>
+              <a:srgbClr val="4472C4">
+                <a:alpha val="36863"/>
+              </a:srgbClr>
+            </a:solidFill>
+            <a:tailEnd type="triangle"/>
+          </a:ln>
+        </p:spPr>
+        <p:style>
+          <a:lnRef idx="3">
+            <a:schemeClr val="accent1"/>
+          </a:lnRef>
+          <a:fillRef idx="0">
+            <a:schemeClr val="accent1"/>
+          </a:fillRef>
+          <a:effectRef idx="2">
+            <a:schemeClr val="accent1"/>
+          </a:effectRef>
+          <a:fontRef idx="minor">
+            <a:schemeClr val="tx1"/>
+          </a:fontRef>
+        </p:style>
+      </p:cxnSp>
+      <p:sp>
+        <p:nvSpPr>
+          <p:cNvPr id="66" name="TextBox 65">
+            <a:extLst>
+              <a:ext uri="{FF2B5EF4-FFF2-40B4-BE49-F238E27FC236}">
+                <a16:creationId xmlns:a16="http://schemas.microsoft.com/office/drawing/2014/main" id="{6CCBCE9C-32FE-4F37-AD3B-054E40C9E48B}"/>
+              </a:ext>
+            </a:extLst>
+          </p:cNvPr>
+          <p:cNvSpPr txBox="1"/>
+          <p:nvPr/>
+        </p:nvSpPr>
+        <p:spPr>
+          <a:xfrm>
+            <a:off x="-7430847" y="2984890"/>
+            <a:ext cx="3197991" cy="1477328"/>
+          </a:xfrm>
+          <a:prstGeom prst="rect">
+            <a:avLst/>
+          </a:prstGeom>
+          <a:noFill/>
+          <a:ln>
+            <a:noFill/>
+          </a:ln>
+          <a:effectLst>
+            <a:outerShdw blurRad="149987" dist="250190" dir="8460000" algn="ctr">
+              <a:srgbClr val="000000">
+                <a:alpha val="28000"/>
+              </a:srgbClr>
+            </a:outerShdw>
+          </a:effectLst>
+          <a:scene3d>
+            <a:camera prst="orthographicFront">
+              <a:rot lat="0" lon="0" rev="0"/>
+            </a:camera>
+            <a:lightRig rig="contrasting" dir="t">
+              <a:rot lat="0" lon="0" rev="1500000"/>
+            </a:lightRig>
+          </a:scene3d>
+          <a:sp3d prstMaterial="metal">
+            <a:bevelT w="88900" h="88900"/>
+          </a:sp3d>
+        </p:spPr>
+        <p:txBody>
+          <a:bodyPr wrap="square" rtlCol="0">
+            <a:spAutoFit/>
+          </a:bodyPr>
+          <a:lstStyle/>
+          <a:p>
+            <a:pPr marL="285750" indent="-285750">
+              <a:buFont typeface="Arial" panose="020B0604020202020204" pitchFamily="34" charset="0"/>
+              <a:buChar char="•"/>
+            </a:pPr>
+            <a:r>
+              <a:rPr lang="en-US" dirty="0"/>
+              <a:t>How one or more Catalogues are loaded</a:t>
+            </a:r>
+          </a:p>
+          <a:p>
+            <a:pPr marL="285750" indent="-285750">
+              <a:buFont typeface="Arial" panose="020B0604020202020204" pitchFamily="34" charset="0"/>
+              <a:buChar char="•"/>
+            </a:pPr>
+            <a:r>
+              <a:rPr lang="en-US" dirty="0"/>
+              <a:t>Sequence of configurable components e.g. load CSV file to RAW</a:t>
+            </a:r>
+          </a:p>
+        </p:txBody>
+      </p:sp>
+      <p:sp>
+        <p:nvSpPr>
+          <p:cNvPr id="80" name="Rectangle: Rounded Corners 79">
+            <a:extLst>
+              <a:ext uri="{FF2B5EF4-FFF2-40B4-BE49-F238E27FC236}">
+                <a16:creationId xmlns:a16="http://schemas.microsoft.com/office/drawing/2014/main" id="{63103215-107B-408A-868D-5BDCF52F2FF3}"/>
+              </a:ext>
+            </a:extLst>
+          </p:cNvPr>
+          <p:cNvSpPr/>
+          <p:nvPr/>
+        </p:nvSpPr>
+        <p:spPr>
+          <a:xfrm>
+            <a:off x="-1057336" y="1292553"/>
+            <a:ext cx="2430969" cy="624114"/>
+          </a:xfrm>
+          <a:prstGeom prst="roundRect">
+            <a:avLst/>
+          </a:prstGeom>
+          <a:ln>
+            <a:noFill/>
+          </a:ln>
+          <a:effectLst>
+            <a:outerShdw blurRad="149987" dist="250190" dir="8460000" algn="ctr">
+              <a:srgbClr val="000000">
+                <a:alpha val="28000"/>
+              </a:srgbClr>
+            </a:outerShdw>
+          </a:effectLst>
+          <a:scene3d>
+            <a:camera prst="orthographicFront">
+              <a:rot lat="0" lon="0" rev="0"/>
+            </a:camera>
+            <a:lightRig rig="contrasting" dir="t">
+              <a:rot lat="0" lon="0" rev="1500000"/>
+            </a:lightRig>
+          </a:scene3d>
+          <a:sp3d prstMaterial="metal">
+            <a:bevelT w="88900" h="88900"/>
+          </a:sp3d>
+        </p:spPr>
+        <p:style>
+          <a:lnRef idx="2">
+            <a:schemeClr val="accent1">
+              <a:shade val="50000"/>
+            </a:schemeClr>
+          </a:lnRef>
+          <a:fillRef idx="1">
+            <a:schemeClr val="accent1"/>
+          </a:fillRef>
+          <a:effectRef idx="0">
+            <a:schemeClr val="accent1"/>
+          </a:effectRef>
+          <a:fontRef idx="minor">
+            <a:schemeClr val="lt1"/>
+          </a:fontRef>
+        </p:style>
+        <p:txBody>
+          <a:bodyPr rtlCol="0" anchor="ctr"/>
+          <a:lstStyle/>
+          <a:p>
+            <a:pPr algn="ctr"/>
+            <a:r>
+              <a:rPr lang="en-US"/>
+              <a:t>ExtractableDataset</a:t>
+            </a:r>
+            <a:endParaRPr lang="en-GB" dirty="0"/>
+          </a:p>
+        </p:txBody>
+      </p:sp>
+      <p:cxnSp>
+        <p:nvCxnSpPr>
+          <p:cNvPr id="81" name="Straight Arrow Connector 80">
+            <a:extLst>
+              <a:ext uri="{FF2B5EF4-FFF2-40B4-BE49-F238E27FC236}">
+                <a16:creationId xmlns:a16="http://schemas.microsoft.com/office/drawing/2014/main" id="{D9D69C26-6D8D-4A09-ADA3-740ADDDDCA75}"/>
+              </a:ext>
+            </a:extLst>
+          </p:cNvPr>
+          <p:cNvCxnSpPr>
+            <a:cxnSpLocks/>
+            <a:stCxn id="56" idx="0"/>
+            <a:endCxn id="80" idx="2"/>
+          </p:cNvCxnSpPr>
+          <p:nvPr/>
+        </p:nvCxnSpPr>
+        <p:spPr>
+          <a:xfrm flipH="1" flipV="1">
+            <a:off x="158149" y="1916667"/>
+            <a:ext cx="1" cy="444109"/>
+          </a:xfrm>
+          <a:prstGeom prst="straightConnector1">
+            <a:avLst/>
+          </a:prstGeom>
+          <a:ln w="57150">
+            <a:solidFill>
+              <a:srgbClr val="4472C4">
+                <a:alpha val="36863"/>
+              </a:srgbClr>
+            </a:solidFill>
+            <a:tailEnd type="triangle"/>
+          </a:ln>
+        </p:spPr>
+        <p:style>
+          <a:lnRef idx="3">
+            <a:schemeClr val="accent1"/>
+          </a:lnRef>
+          <a:fillRef idx="0">
+            <a:schemeClr val="accent1"/>
+          </a:fillRef>
+          <a:effectRef idx="2">
+            <a:schemeClr val="accent1"/>
+          </a:effectRef>
+          <a:fontRef idx="minor">
+            <a:schemeClr val="tx1"/>
+          </a:fontRef>
+        </p:style>
+      </p:cxnSp>
+      <p:sp>
+        <p:nvSpPr>
+          <p:cNvPr id="87" name="Rectangle: Rounded Corners 86">
+            <a:extLst>
+              <a:ext uri="{FF2B5EF4-FFF2-40B4-BE49-F238E27FC236}">
+                <a16:creationId xmlns:a16="http://schemas.microsoft.com/office/drawing/2014/main" id="{DFA9961D-1E7F-44C5-AE06-2A748D75F7DC}"/>
+              </a:ext>
+            </a:extLst>
+          </p:cNvPr>
+          <p:cNvSpPr/>
+          <p:nvPr/>
+        </p:nvSpPr>
+        <p:spPr>
+          <a:xfrm>
+            <a:off x="-6221244" y="-3137043"/>
+            <a:ext cx="2430969" cy="624114"/>
+          </a:xfrm>
+          <a:prstGeom prst="roundRect">
+            <a:avLst/>
+          </a:prstGeom>
+          <a:ln>
+            <a:noFill/>
+          </a:ln>
+          <a:effectLst>
+            <a:outerShdw blurRad="149987" dist="250190" dir="8460000" algn="ctr">
+              <a:srgbClr val="000000">
+                <a:alpha val="28000"/>
+              </a:srgbClr>
+            </a:outerShdw>
+          </a:effectLst>
+          <a:scene3d>
+            <a:camera prst="orthographicFront">
+              <a:rot lat="0" lon="0" rev="0"/>
+            </a:camera>
+            <a:lightRig rig="contrasting" dir="t">
+              <a:rot lat="0" lon="0" rev="1500000"/>
+            </a:lightRig>
+          </a:scene3d>
+          <a:sp3d prstMaterial="metal">
+            <a:bevelT w="88900" h="88900"/>
+          </a:sp3d>
+        </p:spPr>
+        <p:style>
+          <a:lnRef idx="2">
+            <a:schemeClr val="accent1">
+              <a:shade val="50000"/>
+            </a:schemeClr>
+          </a:lnRef>
+          <a:fillRef idx="1">
+            <a:schemeClr val="accent1"/>
+          </a:fillRef>
+          <a:effectRef idx="0">
+            <a:schemeClr val="accent1"/>
+          </a:effectRef>
+          <a:fontRef idx="minor">
+            <a:schemeClr val="lt1"/>
+          </a:fontRef>
+        </p:style>
+        <p:txBody>
+          <a:bodyPr rtlCol="0" anchor="ctr"/>
+          <a:lstStyle/>
+          <a:p>
+            <a:pPr algn="ctr"/>
+            <a:r>
+              <a:rPr lang="en-US" dirty="0"/>
+              <a:t>Project</a:t>
+            </a:r>
+            <a:endParaRPr lang="en-GB" dirty="0"/>
+          </a:p>
+        </p:txBody>
+      </p:sp>
+      <p:sp>
+        <p:nvSpPr>
+          <p:cNvPr id="88" name="Rectangle: Rounded Corners 87">
+            <a:extLst>
+              <a:ext uri="{FF2B5EF4-FFF2-40B4-BE49-F238E27FC236}">
+                <a16:creationId xmlns:a16="http://schemas.microsoft.com/office/drawing/2014/main" id="{30B09A64-07DB-46D2-BC70-F38C787E699D}"/>
+              </a:ext>
+            </a:extLst>
+          </p:cNvPr>
+          <p:cNvSpPr/>
+          <p:nvPr/>
+        </p:nvSpPr>
+        <p:spPr>
+          <a:xfrm>
+            <a:off x="-6232172" y="-2108343"/>
+            <a:ext cx="2430969" cy="624114"/>
+          </a:xfrm>
+          <a:prstGeom prst="roundRect">
+            <a:avLst/>
+          </a:prstGeom>
+          <a:ln>
+            <a:noFill/>
+          </a:ln>
+          <a:effectLst>
+            <a:outerShdw blurRad="149987" dist="250190" dir="8460000" algn="ctr">
+              <a:srgbClr val="000000">
+                <a:alpha val="28000"/>
+              </a:srgbClr>
+            </a:outerShdw>
+          </a:effectLst>
+          <a:scene3d>
+            <a:camera prst="orthographicFront">
+              <a:rot lat="0" lon="0" rev="0"/>
+            </a:camera>
+            <a:lightRig rig="contrasting" dir="t">
+              <a:rot lat="0" lon="0" rev="1500000"/>
+            </a:lightRig>
+          </a:scene3d>
+          <a:sp3d prstMaterial="metal">
+            <a:bevelT w="88900" h="88900"/>
+          </a:sp3d>
+        </p:spPr>
+        <p:style>
+          <a:lnRef idx="2">
+            <a:schemeClr val="accent1">
+              <a:shade val="50000"/>
+            </a:schemeClr>
+          </a:lnRef>
+          <a:fillRef idx="1">
+            <a:schemeClr val="accent1"/>
+          </a:fillRef>
+          <a:effectRef idx="0">
+            <a:schemeClr val="accent1"/>
+          </a:effectRef>
+          <a:fontRef idx="minor">
+            <a:schemeClr val="lt1"/>
+          </a:fontRef>
+        </p:style>
+        <p:txBody>
+          <a:bodyPr rtlCol="0" anchor="ctr"/>
+          <a:lstStyle/>
+          <a:p>
+            <a:pPr algn="ctr"/>
+            <a:r>
+              <a:rPr lang="en-US" dirty="0"/>
+              <a:t>Extraction Configuration</a:t>
+            </a:r>
+            <a:endParaRPr lang="en-GB" dirty="0"/>
+          </a:p>
+        </p:txBody>
+      </p:sp>
+      <p:cxnSp>
+        <p:nvCxnSpPr>
+          <p:cNvPr id="90" name="Straight Arrow Connector 89">
+            <a:extLst>
+              <a:ext uri="{FF2B5EF4-FFF2-40B4-BE49-F238E27FC236}">
+                <a16:creationId xmlns:a16="http://schemas.microsoft.com/office/drawing/2014/main" id="{CD9478EA-8C6D-45F3-9863-205EC4101B69}"/>
+              </a:ext>
+            </a:extLst>
+          </p:cNvPr>
+          <p:cNvCxnSpPr>
+            <a:cxnSpLocks/>
+            <a:stCxn id="80" idx="0"/>
+          </p:cNvCxnSpPr>
+          <p:nvPr/>
+        </p:nvCxnSpPr>
+        <p:spPr>
+          <a:xfrm flipH="1" flipV="1">
+            <a:off x="-3790275" y="-1744500"/>
+            <a:ext cx="3948424" cy="3037053"/>
+          </a:xfrm>
+          <a:prstGeom prst="straightConnector1">
+            <a:avLst/>
+          </a:prstGeom>
+          <a:ln w="57150">
+            <a:solidFill>
+              <a:srgbClr val="4472C4">
+                <a:alpha val="36863"/>
+              </a:srgbClr>
+            </a:solidFill>
+            <a:tailEnd type="triangle"/>
+          </a:ln>
+        </p:spPr>
+        <p:style>
+          <a:lnRef idx="3">
+            <a:schemeClr val="accent1"/>
+          </a:lnRef>
+          <a:fillRef idx="0">
+            <a:schemeClr val="accent1"/>
+          </a:fillRef>
+          <a:effectRef idx="2">
+            <a:schemeClr val="accent1"/>
+          </a:effectRef>
+          <a:fontRef idx="minor">
+            <a:schemeClr val="tx1"/>
+          </a:fontRef>
+        </p:style>
+      </p:cxnSp>
+      <p:cxnSp>
+        <p:nvCxnSpPr>
+          <p:cNvPr id="93" name="Straight Arrow Connector 92">
+            <a:extLst>
+              <a:ext uri="{FF2B5EF4-FFF2-40B4-BE49-F238E27FC236}">
+                <a16:creationId xmlns:a16="http://schemas.microsoft.com/office/drawing/2014/main" id="{97E61DC0-2B71-407E-B8B9-6D957567FE1D}"/>
+              </a:ext>
+            </a:extLst>
+          </p:cNvPr>
+          <p:cNvCxnSpPr>
+            <a:cxnSpLocks/>
+            <a:stCxn id="88" idx="0"/>
+            <a:endCxn id="87" idx="2"/>
+          </p:cNvCxnSpPr>
+          <p:nvPr/>
+        </p:nvCxnSpPr>
+        <p:spPr>
+          <a:xfrm flipV="1">
+            <a:off x="-5016687" y="-2512929"/>
+            <a:ext cx="10928" cy="404586"/>
+          </a:xfrm>
+          <a:prstGeom prst="straightConnector1">
+            <a:avLst/>
+          </a:prstGeom>
+          <a:ln w="57150">
+            <a:solidFill>
+              <a:srgbClr val="4472C4">
+                <a:alpha val="36863"/>
+              </a:srgbClr>
+            </a:solidFill>
+            <a:tailEnd type="triangle"/>
+          </a:ln>
+        </p:spPr>
+        <p:style>
+          <a:lnRef idx="3">
+            <a:schemeClr val="accent1"/>
+          </a:lnRef>
+          <a:fillRef idx="0">
+            <a:schemeClr val="accent1"/>
+          </a:fillRef>
+          <a:effectRef idx="2">
+            <a:schemeClr val="accent1"/>
+          </a:effectRef>
+          <a:fontRef idx="minor">
+            <a:schemeClr val="tx1"/>
+          </a:fontRef>
+        </p:style>
+      </p:cxnSp>
+      <p:sp>
+        <p:nvSpPr>
+          <p:cNvPr id="99" name="Rectangle: Rounded Corners 98">
+            <a:extLst>
+              <a:ext uri="{FF2B5EF4-FFF2-40B4-BE49-F238E27FC236}">
+                <a16:creationId xmlns:a16="http://schemas.microsoft.com/office/drawing/2014/main" id="{04C8DAD1-9294-4C94-B736-7C981B12904B}"/>
+              </a:ext>
+            </a:extLst>
+          </p:cNvPr>
+          <p:cNvSpPr/>
+          <p:nvPr/>
+        </p:nvSpPr>
+        <p:spPr>
+          <a:xfrm>
+            <a:off x="2609922" y="-2871208"/>
+            <a:ext cx="2430969" cy="624114"/>
+          </a:xfrm>
+          <a:prstGeom prst="roundRect">
+            <a:avLst/>
+          </a:prstGeom>
+          <a:ln>
+            <a:noFill/>
+          </a:ln>
+          <a:effectLst>
+            <a:outerShdw blurRad="149987" dist="250190" dir="8460000" algn="ctr">
+              <a:srgbClr val="000000">
+                <a:alpha val="28000"/>
+              </a:srgbClr>
+            </a:outerShdw>
+          </a:effectLst>
+          <a:scene3d>
+            <a:camera prst="orthographicFront">
+              <a:rot lat="0" lon="0" rev="0"/>
+            </a:camera>
+            <a:lightRig rig="contrasting" dir="t">
+              <a:rot lat="0" lon="0" rev="1500000"/>
+            </a:lightRig>
+          </a:scene3d>
+          <a:sp3d prstMaterial="metal">
+            <a:bevelT w="88900" h="88900"/>
+          </a:sp3d>
+        </p:spPr>
+        <p:style>
+          <a:lnRef idx="2">
+            <a:schemeClr val="accent1">
+              <a:shade val="50000"/>
+            </a:schemeClr>
+          </a:lnRef>
+          <a:fillRef idx="1">
+            <a:schemeClr val="accent1"/>
+          </a:fillRef>
+          <a:effectRef idx="0">
+            <a:schemeClr val="accent1"/>
+          </a:effectRef>
+          <a:fontRef idx="minor">
+            <a:schemeClr val="lt1"/>
+          </a:fontRef>
+        </p:style>
+        <p:txBody>
+          <a:bodyPr rtlCol="0" anchor="ctr"/>
+          <a:lstStyle/>
+          <a:p>
+            <a:pPr algn="ctr"/>
+            <a:r>
+              <a:rPr lang="en-US" dirty="0"/>
+              <a:t>Cohort Identification Configuration</a:t>
+            </a:r>
+            <a:endParaRPr lang="en-GB" dirty="0"/>
+          </a:p>
+        </p:txBody>
+      </p:sp>
+      <p:sp>
+        <p:nvSpPr>
+          <p:cNvPr id="100" name="Rectangle: Rounded Corners 99">
+            <a:extLst>
+              <a:ext uri="{FF2B5EF4-FFF2-40B4-BE49-F238E27FC236}">
+                <a16:creationId xmlns:a16="http://schemas.microsoft.com/office/drawing/2014/main" id="{F68DD93F-8B11-4107-8349-57D643B83876}"/>
+              </a:ext>
+            </a:extLst>
+          </p:cNvPr>
+          <p:cNvSpPr/>
+          <p:nvPr/>
+        </p:nvSpPr>
+        <p:spPr>
+          <a:xfrm>
+            <a:off x="2609922" y="-1914896"/>
+            <a:ext cx="2430969" cy="624114"/>
+          </a:xfrm>
+          <a:prstGeom prst="roundRect">
+            <a:avLst/>
+          </a:prstGeom>
+          <a:ln>
+            <a:noFill/>
+          </a:ln>
+          <a:effectLst>
+            <a:outerShdw blurRad="149987" dist="250190" dir="8460000" algn="ctr">
+              <a:srgbClr val="000000">
+                <a:alpha val="28000"/>
+              </a:srgbClr>
+            </a:outerShdw>
+          </a:effectLst>
+          <a:scene3d>
+            <a:camera prst="orthographicFront">
+              <a:rot lat="0" lon="0" rev="0"/>
+            </a:camera>
+            <a:lightRig rig="contrasting" dir="t">
+              <a:rot lat="0" lon="0" rev="1500000"/>
+            </a:lightRig>
+          </a:scene3d>
+          <a:sp3d prstMaterial="metal">
+            <a:bevelT w="88900" h="88900"/>
+          </a:sp3d>
+        </p:spPr>
+        <p:style>
+          <a:lnRef idx="2">
+            <a:schemeClr val="accent1">
+              <a:shade val="50000"/>
+            </a:schemeClr>
+          </a:lnRef>
+          <a:fillRef idx="1">
+            <a:schemeClr val="accent1"/>
+          </a:fillRef>
+          <a:effectRef idx="0">
+            <a:schemeClr val="accent1"/>
+          </a:effectRef>
+          <a:fontRef idx="minor">
+            <a:schemeClr val="lt1"/>
+          </a:fontRef>
+        </p:style>
+        <p:txBody>
+          <a:bodyPr rtlCol="0" anchor="ctr"/>
+          <a:lstStyle/>
+          <a:p>
+            <a:pPr algn="ctr"/>
+            <a:r>
+              <a:rPr lang="en-GB" dirty="0"/>
+              <a:t>Cohort Aggregate Container</a:t>
+            </a:r>
+          </a:p>
+        </p:txBody>
+      </p:sp>
+      <p:sp>
+        <p:nvSpPr>
+          <p:cNvPr id="101" name="Rectangle: Rounded Corners 100">
+            <a:extLst>
+              <a:ext uri="{FF2B5EF4-FFF2-40B4-BE49-F238E27FC236}">
+                <a16:creationId xmlns:a16="http://schemas.microsoft.com/office/drawing/2014/main" id="{84869279-2A57-4BD4-BB15-2F4CD75FDC26}"/>
+              </a:ext>
+            </a:extLst>
+          </p:cNvPr>
+          <p:cNvSpPr/>
+          <p:nvPr/>
+        </p:nvSpPr>
+        <p:spPr>
+          <a:xfrm>
+            <a:off x="2609922" y="-823076"/>
+            <a:ext cx="2430969" cy="624114"/>
+          </a:xfrm>
+          <a:prstGeom prst="roundRect">
+            <a:avLst/>
+          </a:prstGeom>
+          <a:ln>
+            <a:noFill/>
+          </a:ln>
+          <a:effectLst>
+            <a:outerShdw blurRad="149987" dist="250190" dir="8460000" algn="ctr">
+              <a:srgbClr val="000000">
+                <a:alpha val="28000"/>
+              </a:srgbClr>
+            </a:outerShdw>
+          </a:effectLst>
+          <a:scene3d>
+            <a:camera prst="orthographicFront">
+              <a:rot lat="0" lon="0" rev="0"/>
+            </a:camera>
+            <a:lightRig rig="contrasting" dir="t">
+              <a:rot lat="0" lon="0" rev="1500000"/>
+            </a:lightRig>
+          </a:scene3d>
+          <a:sp3d prstMaterial="metal">
+            <a:bevelT w="88900" h="88900"/>
+          </a:sp3d>
+        </p:spPr>
+        <p:style>
+          <a:lnRef idx="2">
+            <a:schemeClr val="accent1">
+              <a:shade val="50000"/>
+            </a:schemeClr>
+          </a:lnRef>
+          <a:fillRef idx="1">
+            <a:schemeClr val="accent1"/>
+          </a:fillRef>
+          <a:effectRef idx="0">
+            <a:schemeClr val="accent1"/>
+          </a:effectRef>
+          <a:fontRef idx="minor">
+            <a:schemeClr val="lt1"/>
+          </a:fontRef>
+        </p:style>
+        <p:txBody>
+          <a:bodyPr rtlCol="0" anchor="ctr"/>
+          <a:lstStyle/>
+          <a:p>
+            <a:pPr algn="ctr"/>
+            <a:r>
+              <a:rPr lang="en-GB" dirty="0"/>
+              <a:t>Aggregate Configuration</a:t>
+            </a:r>
+          </a:p>
+        </p:txBody>
+      </p:sp>
+      <p:cxnSp>
+        <p:nvCxnSpPr>
+          <p:cNvPr id="102" name="Straight Arrow Connector 101">
+            <a:extLst>
+              <a:ext uri="{FF2B5EF4-FFF2-40B4-BE49-F238E27FC236}">
+                <a16:creationId xmlns:a16="http://schemas.microsoft.com/office/drawing/2014/main" id="{60B6CC41-7D02-4B4C-BFA6-8C2F2745BB3B}"/>
+              </a:ext>
+            </a:extLst>
+          </p:cNvPr>
+          <p:cNvCxnSpPr>
+            <a:cxnSpLocks/>
+            <a:endCxn id="101" idx="2"/>
+          </p:cNvCxnSpPr>
+          <p:nvPr/>
+        </p:nvCxnSpPr>
+        <p:spPr>
+          <a:xfrm flipV="1">
+            <a:off x="1373633" y="-198962"/>
+            <a:ext cx="2451774" cy="2559738"/>
+          </a:xfrm>
+          <a:prstGeom prst="straightConnector1">
+            <a:avLst/>
+          </a:prstGeom>
+          <a:ln w="57150">
+            <a:solidFill>
+              <a:srgbClr val="4472C4">
+                <a:alpha val="36863"/>
+              </a:srgbClr>
+            </a:solidFill>
+            <a:tailEnd type="triangle"/>
+          </a:ln>
+        </p:spPr>
+        <p:style>
+          <a:lnRef idx="3">
+            <a:schemeClr val="accent1"/>
+          </a:lnRef>
+          <a:fillRef idx="0">
+            <a:schemeClr val="accent1"/>
+          </a:fillRef>
+          <a:effectRef idx="2">
+            <a:schemeClr val="accent1"/>
+          </a:effectRef>
+          <a:fontRef idx="minor">
+            <a:schemeClr val="tx1"/>
+          </a:fontRef>
+        </p:style>
+      </p:cxnSp>
+      <p:sp>
+        <p:nvSpPr>
+          <p:cNvPr id="106" name="TextBox 105">
+            <a:extLst>
+              <a:ext uri="{FF2B5EF4-FFF2-40B4-BE49-F238E27FC236}">
+                <a16:creationId xmlns:a16="http://schemas.microsoft.com/office/drawing/2014/main" id="{EEAC4079-196F-4F24-83BB-C95683373755}"/>
+              </a:ext>
+            </a:extLst>
+          </p:cNvPr>
+          <p:cNvSpPr txBox="1"/>
+          <p:nvPr/>
+        </p:nvSpPr>
+        <p:spPr>
+          <a:xfrm>
+            <a:off x="5088493" y="-856371"/>
+            <a:ext cx="3197991" cy="1200329"/>
+          </a:xfrm>
+          <a:prstGeom prst="rect">
+            <a:avLst/>
+          </a:prstGeom>
+          <a:noFill/>
+          <a:ln>
+            <a:noFill/>
+          </a:ln>
+          <a:effectLst>
+            <a:outerShdw blurRad="149987" dist="250190" dir="8460000" algn="ctr">
+              <a:srgbClr val="000000">
+                <a:alpha val="28000"/>
+              </a:srgbClr>
+            </a:outerShdw>
+          </a:effectLst>
+          <a:scene3d>
+            <a:camera prst="orthographicFront">
+              <a:rot lat="0" lon="0" rev="0"/>
+            </a:camera>
+            <a:lightRig rig="contrasting" dir="t">
+              <a:rot lat="0" lon="0" rev="1500000"/>
+            </a:lightRig>
+          </a:scene3d>
+          <a:sp3d prstMaterial="metal">
+            <a:bevelT w="88900" h="88900"/>
+          </a:sp3d>
+        </p:spPr>
+        <p:txBody>
+          <a:bodyPr wrap="square" rtlCol="0">
+            <a:spAutoFit/>
+          </a:bodyPr>
+          <a:lstStyle/>
+          <a:p>
+            <a:pPr marL="285750" indent="-285750">
+              <a:buFont typeface="Arial" panose="020B0604020202020204" pitchFamily="34" charset="0"/>
+              <a:buChar char="•"/>
+            </a:pPr>
+            <a:r>
+              <a:rPr lang="en-US" dirty="0"/>
+              <a:t>Uses a Catalogue to identify a subset of patients</a:t>
+            </a:r>
+          </a:p>
+          <a:p>
+            <a:pPr marL="285750" indent="-285750">
+              <a:buFont typeface="Arial" panose="020B0604020202020204" pitchFamily="34" charset="0"/>
+              <a:buChar char="•"/>
+            </a:pPr>
+            <a:r>
+              <a:rPr lang="en-US" dirty="0"/>
+              <a:t>Can contain one or more filters with AND/OR logic</a:t>
+            </a:r>
+          </a:p>
+        </p:txBody>
+      </p:sp>
+      <p:sp>
+        <p:nvSpPr>
+          <p:cNvPr id="107" name="TextBox 106">
+            <a:extLst>
+              <a:ext uri="{FF2B5EF4-FFF2-40B4-BE49-F238E27FC236}">
+                <a16:creationId xmlns:a16="http://schemas.microsoft.com/office/drawing/2014/main" id="{4E3DFB3D-228C-4794-9CD3-22ED5C19FF68}"/>
+              </a:ext>
+            </a:extLst>
+          </p:cNvPr>
+          <p:cNvSpPr txBox="1"/>
+          <p:nvPr/>
+        </p:nvSpPr>
+        <p:spPr>
+          <a:xfrm>
+            <a:off x="5088493" y="-2154133"/>
+            <a:ext cx="3197991" cy="1200329"/>
+          </a:xfrm>
+          <a:prstGeom prst="rect">
+            <a:avLst/>
+          </a:prstGeom>
+          <a:noFill/>
+          <a:ln>
+            <a:noFill/>
+          </a:ln>
+          <a:effectLst>
+            <a:outerShdw blurRad="149987" dist="250190" dir="8460000" algn="ctr">
+              <a:srgbClr val="000000">
+                <a:alpha val="28000"/>
+              </a:srgbClr>
+            </a:outerShdw>
+          </a:effectLst>
+          <a:scene3d>
+            <a:camera prst="orthographicFront">
+              <a:rot lat="0" lon="0" rev="0"/>
+            </a:camera>
+            <a:lightRig rig="contrasting" dir="t">
+              <a:rot lat="0" lon="0" rev="1500000"/>
+            </a:lightRig>
+          </a:scene3d>
+          <a:sp3d prstMaterial="metal">
+            <a:bevelT w="88900" h="88900"/>
+          </a:sp3d>
+        </p:spPr>
+        <p:txBody>
+          <a:bodyPr wrap="square" rtlCol="0">
+            <a:spAutoFit/>
+          </a:bodyPr>
+          <a:lstStyle/>
+          <a:p>
+            <a:pPr marL="285750" indent="-285750">
+              <a:buFont typeface="Arial" panose="020B0604020202020204" pitchFamily="34" charset="0"/>
+              <a:buChar char="•"/>
+            </a:pPr>
+            <a:r>
+              <a:rPr lang="en-US" dirty="0"/>
+              <a:t>Groups sets of patients e.g. exclusion criteria</a:t>
+            </a:r>
+          </a:p>
+          <a:p>
+            <a:pPr marL="285750" indent="-285750">
+              <a:buFont typeface="Arial" panose="020B0604020202020204" pitchFamily="34" charset="0"/>
+              <a:buChar char="•"/>
+            </a:pPr>
+            <a:r>
+              <a:rPr lang="en-US" dirty="0"/>
+              <a:t>Includes set operation e.g. INTERSECT / UNION</a:t>
+            </a:r>
+          </a:p>
+        </p:txBody>
+      </p:sp>
+      <p:sp>
+        <p:nvSpPr>
+          <p:cNvPr id="108" name="TextBox 107">
+            <a:extLst>
+              <a:ext uri="{FF2B5EF4-FFF2-40B4-BE49-F238E27FC236}">
+                <a16:creationId xmlns:a16="http://schemas.microsoft.com/office/drawing/2014/main" id="{F2B6F685-B222-4BF0-85D5-287FFCA3F677}"/>
+              </a:ext>
+            </a:extLst>
+          </p:cNvPr>
+          <p:cNvSpPr txBox="1"/>
+          <p:nvPr/>
+        </p:nvSpPr>
+        <p:spPr>
+          <a:xfrm>
+            <a:off x="5140880" y="-2882261"/>
+            <a:ext cx="3197991" cy="369332"/>
+          </a:xfrm>
+          <a:prstGeom prst="rect">
+            <a:avLst/>
+          </a:prstGeom>
+          <a:noFill/>
+          <a:ln>
+            <a:noFill/>
+          </a:ln>
+          <a:effectLst>
+            <a:outerShdw blurRad="149987" dist="250190" dir="8460000" algn="ctr">
+              <a:srgbClr val="000000">
+                <a:alpha val="28000"/>
+              </a:srgbClr>
+            </a:outerShdw>
+          </a:effectLst>
+          <a:scene3d>
+            <a:camera prst="orthographicFront">
+              <a:rot lat="0" lon="0" rev="0"/>
+            </a:camera>
+            <a:lightRig rig="contrasting" dir="t">
+              <a:rot lat="0" lon="0" rev="1500000"/>
+            </a:lightRig>
+          </a:scene3d>
+          <a:sp3d prstMaterial="metal">
+            <a:bevelT w="88900" h="88900"/>
+          </a:sp3d>
+        </p:spPr>
+        <p:txBody>
+          <a:bodyPr wrap="square" rtlCol="0">
+            <a:spAutoFit/>
+          </a:bodyPr>
+          <a:lstStyle/>
+          <a:p>
+            <a:pPr marL="285750" indent="-285750">
+              <a:buFont typeface="Arial" panose="020B0604020202020204" pitchFamily="34" charset="0"/>
+              <a:buChar char="•"/>
+            </a:pPr>
+            <a:r>
+              <a:rPr lang="en-US" dirty="0"/>
+              <a:t>Human readable description</a:t>
+            </a:r>
+          </a:p>
+        </p:txBody>
+      </p:sp>
+      <p:cxnSp>
+        <p:nvCxnSpPr>
+          <p:cNvPr id="109" name="Straight Arrow Connector 108">
+            <a:extLst>
+              <a:ext uri="{FF2B5EF4-FFF2-40B4-BE49-F238E27FC236}">
+                <a16:creationId xmlns:a16="http://schemas.microsoft.com/office/drawing/2014/main" id="{6E88FD4D-2F9C-458F-8C12-DA130A76D0D2}"/>
+              </a:ext>
+            </a:extLst>
+          </p:cNvPr>
+          <p:cNvCxnSpPr>
+            <a:cxnSpLocks/>
+            <a:stCxn id="101" idx="0"/>
+            <a:endCxn id="100" idx="2"/>
+          </p:cNvCxnSpPr>
+          <p:nvPr/>
+        </p:nvCxnSpPr>
+        <p:spPr>
+          <a:xfrm flipV="1">
+            <a:off x="3825407" y="-1290782"/>
+            <a:ext cx="0" cy="467706"/>
+          </a:xfrm>
+          <a:prstGeom prst="straightConnector1">
+            <a:avLst/>
+          </a:prstGeom>
+          <a:ln w="57150">
+            <a:solidFill>
+              <a:srgbClr val="4472C4">
+                <a:alpha val="36863"/>
+              </a:srgbClr>
+            </a:solidFill>
+            <a:tailEnd type="triangle"/>
+          </a:ln>
+        </p:spPr>
+        <p:style>
+          <a:lnRef idx="3">
+            <a:schemeClr val="accent1"/>
+          </a:lnRef>
+          <a:fillRef idx="0">
+            <a:schemeClr val="accent1"/>
+          </a:fillRef>
+          <a:effectRef idx="2">
+            <a:schemeClr val="accent1"/>
+          </a:effectRef>
+          <a:fontRef idx="minor">
+            <a:schemeClr val="tx1"/>
+          </a:fontRef>
+        </p:style>
+      </p:cxnSp>
+      <p:cxnSp>
+        <p:nvCxnSpPr>
+          <p:cNvPr id="115" name="Straight Arrow Connector 114">
+            <a:extLst>
+              <a:ext uri="{FF2B5EF4-FFF2-40B4-BE49-F238E27FC236}">
+                <a16:creationId xmlns:a16="http://schemas.microsoft.com/office/drawing/2014/main" id="{A46051EC-6F64-43E4-AE83-E6F4C1EB32CB}"/>
+              </a:ext>
+            </a:extLst>
+          </p:cNvPr>
+          <p:cNvCxnSpPr>
+            <a:cxnSpLocks/>
+            <a:stCxn id="100" idx="0"/>
+            <a:endCxn id="99" idx="2"/>
+          </p:cNvCxnSpPr>
+          <p:nvPr/>
+        </p:nvCxnSpPr>
+        <p:spPr>
+          <a:xfrm flipV="1">
+            <a:off x="3825407" y="-2247094"/>
+            <a:ext cx="0" cy="332198"/>
+          </a:xfrm>
+          <a:prstGeom prst="straightConnector1">
+            <a:avLst/>
+          </a:prstGeom>
+          <a:ln w="57150">
+            <a:solidFill>
+              <a:srgbClr val="4472C4">
+                <a:alpha val="36863"/>
+              </a:srgbClr>
+            </a:solidFill>
+            <a:tailEnd type="triangle"/>
+          </a:ln>
+        </p:spPr>
+        <p:style>
+          <a:lnRef idx="3">
+            <a:schemeClr val="accent1"/>
+          </a:lnRef>
+          <a:fillRef idx="0">
+            <a:schemeClr val="accent1"/>
+          </a:fillRef>
+          <a:effectRef idx="2">
+            <a:schemeClr val="accent1"/>
+          </a:effectRef>
+          <a:fontRef idx="minor">
+            <a:schemeClr val="tx1"/>
+          </a:fontRef>
+        </p:style>
+      </p:cxnSp>
+      <p:cxnSp>
+        <p:nvCxnSpPr>
+          <p:cNvPr id="118" name="Straight Arrow Connector 117">
+            <a:extLst>
+              <a:ext uri="{FF2B5EF4-FFF2-40B4-BE49-F238E27FC236}">
+                <a16:creationId xmlns:a16="http://schemas.microsoft.com/office/drawing/2014/main" id="{74AED737-D606-4220-9298-5E936299C3C5}"/>
+              </a:ext>
+            </a:extLst>
+          </p:cNvPr>
+          <p:cNvCxnSpPr>
+            <a:cxnSpLocks/>
+            <a:stCxn id="99" idx="1"/>
+            <a:endCxn id="123" idx="3"/>
+          </p:cNvCxnSpPr>
+          <p:nvPr/>
+        </p:nvCxnSpPr>
+        <p:spPr>
+          <a:xfrm flipH="1" flipV="1">
+            <a:off x="2184067" y="-2570204"/>
+            <a:ext cx="425855" cy="11053"/>
+          </a:xfrm>
+          <a:prstGeom prst="straightConnector1">
+            <a:avLst/>
+          </a:prstGeom>
+          <a:ln w="57150">
+            <a:solidFill>
+              <a:srgbClr val="4472C4">
+                <a:alpha val="36863"/>
+              </a:srgbClr>
+            </a:solidFill>
+            <a:tailEnd type="triangle"/>
+          </a:ln>
+        </p:spPr>
+        <p:style>
+          <a:lnRef idx="3">
+            <a:schemeClr val="accent1"/>
+          </a:lnRef>
+          <a:fillRef idx="0">
+            <a:schemeClr val="accent1"/>
+          </a:fillRef>
+          <a:effectRef idx="2">
+            <a:schemeClr val="accent1"/>
+          </a:effectRef>
+          <a:fontRef idx="minor">
+            <a:schemeClr val="tx1"/>
+          </a:fontRef>
+        </p:style>
+      </p:cxnSp>
+      <p:sp>
+        <p:nvSpPr>
+          <p:cNvPr id="123" name="Rectangle: Rounded Corners 122">
+            <a:extLst>
+              <a:ext uri="{FF2B5EF4-FFF2-40B4-BE49-F238E27FC236}">
+                <a16:creationId xmlns:a16="http://schemas.microsoft.com/office/drawing/2014/main" id="{508F9D77-5D9E-4395-88F1-7696BDD83B5B}"/>
+              </a:ext>
+            </a:extLst>
+          </p:cNvPr>
+          <p:cNvSpPr/>
+          <p:nvPr/>
+        </p:nvSpPr>
+        <p:spPr>
+          <a:xfrm>
+            <a:off x="-246902" y="-2882261"/>
+            <a:ext cx="2430969" cy="624114"/>
+          </a:xfrm>
+          <a:prstGeom prst="roundRect">
+            <a:avLst/>
+          </a:prstGeom>
+          <a:ln>
+            <a:noFill/>
+          </a:ln>
+          <a:effectLst>
+            <a:outerShdw blurRad="149987" dist="250190" dir="8460000" algn="ctr">
+              <a:srgbClr val="000000">
+                <a:alpha val="28000"/>
+              </a:srgbClr>
+            </a:outerShdw>
+          </a:effectLst>
+          <a:scene3d>
+            <a:camera prst="orthographicFront">
+              <a:rot lat="0" lon="0" rev="0"/>
+            </a:camera>
+            <a:lightRig rig="contrasting" dir="t">
+              <a:rot lat="0" lon="0" rev="1500000"/>
+            </a:lightRig>
+          </a:scene3d>
+          <a:sp3d prstMaterial="metal">
+            <a:bevelT w="88900" h="88900"/>
+          </a:sp3d>
+        </p:spPr>
+        <p:style>
+          <a:lnRef idx="2">
+            <a:schemeClr val="accent1">
+              <a:shade val="50000"/>
+            </a:schemeClr>
+          </a:lnRef>
+          <a:fillRef idx="1">
+            <a:schemeClr val="accent1"/>
+          </a:fillRef>
+          <a:effectRef idx="0">
+            <a:schemeClr val="accent1"/>
+          </a:effectRef>
+          <a:fontRef idx="minor">
+            <a:schemeClr val="lt1"/>
+          </a:fontRef>
+        </p:style>
+        <p:txBody>
+          <a:bodyPr rtlCol="0" anchor="ctr"/>
+          <a:lstStyle/>
+          <a:p>
+            <a:pPr algn="ctr"/>
+            <a:r>
+              <a:rPr lang="en-US" dirty="0"/>
+              <a:t>Extractable Cohort</a:t>
+            </a:r>
+            <a:endParaRPr lang="en-GB" dirty="0"/>
+          </a:p>
+        </p:txBody>
+      </p:sp>
+      <p:sp>
+        <p:nvSpPr>
+          <p:cNvPr id="126" name="TextBox 125">
+            <a:extLst>
+              <a:ext uri="{FF2B5EF4-FFF2-40B4-BE49-F238E27FC236}">
+                <a16:creationId xmlns:a16="http://schemas.microsoft.com/office/drawing/2014/main" id="{DD0D1CB9-F46E-4613-A792-698416FD8F42}"/>
+              </a:ext>
+            </a:extLst>
+          </p:cNvPr>
+          <p:cNvSpPr txBox="1"/>
+          <p:nvPr/>
+        </p:nvSpPr>
+        <p:spPr>
+          <a:xfrm>
+            <a:off x="-378285" y="-2195308"/>
+            <a:ext cx="3197991" cy="923330"/>
+          </a:xfrm>
+          <a:prstGeom prst="rect">
+            <a:avLst/>
+          </a:prstGeom>
+          <a:noFill/>
+          <a:ln>
+            <a:noFill/>
+          </a:ln>
+          <a:effectLst>
+            <a:outerShdw blurRad="149987" dist="250190" dir="8460000" algn="ctr">
+              <a:srgbClr val="000000">
+                <a:alpha val="28000"/>
+              </a:srgbClr>
+            </a:outerShdw>
+          </a:effectLst>
+          <a:scene3d>
+            <a:camera prst="orthographicFront">
+              <a:rot lat="0" lon="0" rev="0"/>
+            </a:camera>
+            <a:lightRig rig="contrasting" dir="t">
+              <a:rot lat="0" lon="0" rev="1500000"/>
+            </a:lightRig>
+          </a:scene3d>
+          <a:sp3d prstMaterial="metal">
+            <a:bevelT w="88900" h="88900"/>
+          </a:sp3d>
+        </p:spPr>
+        <p:txBody>
+          <a:bodyPr wrap="square" rtlCol="0">
+            <a:spAutoFit/>
+          </a:bodyPr>
+          <a:lstStyle/>
+          <a:p>
+            <a:pPr marL="285750" indent="-285750">
+              <a:buFont typeface="Arial" panose="020B0604020202020204" pitchFamily="34" charset="0"/>
+              <a:buChar char="•"/>
+            </a:pPr>
+            <a:r>
+              <a:rPr lang="en-US" dirty="0"/>
+              <a:t>Finalized list of patients</a:t>
+            </a:r>
+          </a:p>
+          <a:p>
+            <a:pPr marL="285750" indent="-285750">
+              <a:buFont typeface="Arial" panose="020B0604020202020204" pitchFamily="34" charset="0"/>
+              <a:buChar char="•"/>
+            </a:pPr>
+            <a:r>
+              <a:rPr lang="en-US" dirty="0"/>
+              <a:t>Anonymous release identifier mapping</a:t>
+            </a:r>
+          </a:p>
+        </p:txBody>
+      </p:sp>
+      <p:cxnSp>
+        <p:nvCxnSpPr>
+          <p:cNvPr id="128" name="Straight Arrow Connector 127">
+            <a:extLst>
+              <a:ext uri="{FF2B5EF4-FFF2-40B4-BE49-F238E27FC236}">
+                <a16:creationId xmlns:a16="http://schemas.microsoft.com/office/drawing/2014/main" id="{4B703E59-DF21-4E6E-BB2A-F0ABAAD1CC2E}"/>
+              </a:ext>
+            </a:extLst>
+          </p:cNvPr>
+          <p:cNvCxnSpPr>
+            <a:cxnSpLocks/>
+            <a:stCxn id="123" idx="1"/>
+            <a:endCxn id="88" idx="3"/>
+          </p:cNvCxnSpPr>
+          <p:nvPr/>
+        </p:nvCxnSpPr>
+        <p:spPr>
+          <a:xfrm flipH="1">
+            <a:off x="-3801203" y="-2570204"/>
+            <a:ext cx="3554301" cy="773918"/>
+          </a:xfrm>
+          <a:prstGeom prst="straightConnector1">
+            <a:avLst/>
+          </a:prstGeom>
+          <a:ln w="57150">
+            <a:solidFill>
+              <a:srgbClr val="4472C4">
+                <a:alpha val="36863"/>
+              </a:srgbClr>
+            </a:solidFill>
+            <a:tailEnd type="triangle"/>
+          </a:ln>
+        </p:spPr>
+        <p:style>
+          <a:lnRef idx="3">
+            <a:schemeClr val="accent1"/>
+          </a:lnRef>
+          <a:fillRef idx="0">
+            <a:schemeClr val="accent1"/>
+          </a:fillRef>
+          <a:effectRef idx="2">
+            <a:schemeClr val="accent1"/>
+          </a:effectRef>
+          <a:fontRef idx="minor">
+            <a:schemeClr val="tx1"/>
+          </a:fontRef>
+        </p:style>
+      </p:cxnSp>
+      <p:sp>
+        <p:nvSpPr>
+          <p:cNvPr id="132" name="TextBox 131">
+            <a:extLst>
+              <a:ext uri="{FF2B5EF4-FFF2-40B4-BE49-F238E27FC236}">
+                <a16:creationId xmlns:a16="http://schemas.microsoft.com/office/drawing/2014/main" id="{156A7A6F-6795-4593-A38B-85137F64C6A4}"/>
+              </a:ext>
+            </a:extLst>
+          </p:cNvPr>
+          <p:cNvSpPr txBox="1"/>
+          <p:nvPr/>
+        </p:nvSpPr>
+        <p:spPr>
+          <a:xfrm>
+            <a:off x="-6355841" y="-1411783"/>
+            <a:ext cx="3197991" cy="1477328"/>
+          </a:xfrm>
+          <a:prstGeom prst="rect">
+            <a:avLst/>
+          </a:prstGeom>
+          <a:noFill/>
+          <a:ln>
+            <a:noFill/>
+          </a:ln>
+          <a:effectLst>
+            <a:outerShdw blurRad="149987" dist="250190" dir="8460000" algn="ctr">
+              <a:srgbClr val="000000">
+                <a:alpha val="28000"/>
+              </a:srgbClr>
+            </a:outerShdw>
+          </a:effectLst>
+          <a:scene3d>
+            <a:camera prst="orthographicFront">
+              <a:rot lat="0" lon="0" rev="0"/>
+            </a:camera>
+            <a:lightRig rig="contrasting" dir="t">
+              <a:rot lat="0" lon="0" rev="1500000"/>
+            </a:lightRig>
+          </a:scene3d>
+          <a:sp3d prstMaterial="metal">
+            <a:bevelT w="88900" h="88900"/>
+          </a:sp3d>
+        </p:spPr>
+        <p:txBody>
+          <a:bodyPr wrap="square" rtlCol="0">
+            <a:spAutoFit/>
+          </a:bodyPr>
+          <a:lstStyle/>
+          <a:p>
+            <a:pPr marL="285750" indent="-285750">
+              <a:buFont typeface="Arial" panose="020B0604020202020204" pitchFamily="34" charset="0"/>
+              <a:buChar char="•"/>
+            </a:pPr>
+            <a:r>
+              <a:rPr lang="en-US" dirty="0"/>
+              <a:t>Which datasets are selected for extraction</a:t>
+            </a:r>
+          </a:p>
+          <a:p>
+            <a:pPr marL="285750" indent="-285750">
+              <a:buFont typeface="Arial" panose="020B0604020202020204" pitchFamily="34" charset="0"/>
+              <a:buChar char="•"/>
+            </a:pPr>
+            <a:r>
+              <a:rPr lang="en-US" dirty="0"/>
+              <a:t>What filters are applied (when extracting records)</a:t>
+            </a:r>
+          </a:p>
+          <a:p>
+            <a:pPr marL="285750" indent="-285750">
+              <a:buFont typeface="Arial" panose="020B0604020202020204" pitchFamily="34" charset="0"/>
+              <a:buChar char="•"/>
+            </a:pPr>
+            <a:r>
+              <a:rPr lang="en-US" dirty="0"/>
+              <a:t>What cohort is linked against</a:t>
+            </a:r>
+          </a:p>
+        </p:txBody>
+      </p:sp>
+      <p:sp>
+        <p:nvSpPr>
+          <p:cNvPr id="133" name="TextBox 132">
+            <a:extLst>
+              <a:ext uri="{FF2B5EF4-FFF2-40B4-BE49-F238E27FC236}">
+                <a16:creationId xmlns:a16="http://schemas.microsoft.com/office/drawing/2014/main" id="{9353654D-F4A8-4B99-972B-239277C115C4}"/>
+              </a:ext>
+            </a:extLst>
+          </p:cNvPr>
+          <p:cNvSpPr txBox="1"/>
+          <p:nvPr/>
+        </p:nvSpPr>
+        <p:spPr>
+          <a:xfrm>
+            <a:off x="-9419235" y="-3241604"/>
+            <a:ext cx="3197991" cy="923330"/>
+          </a:xfrm>
+          <a:prstGeom prst="rect">
+            <a:avLst/>
+          </a:prstGeom>
+          <a:noFill/>
+          <a:ln>
+            <a:noFill/>
+          </a:ln>
+          <a:effectLst>
+            <a:outerShdw blurRad="149987" dist="250190" dir="8460000" algn="ctr">
+              <a:srgbClr val="000000">
+                <a:alpha val="28000"/>
+              </a:srgbClr>
+            </a:outerShdw>
+          </a:effectLst>
+          <a:scene3d>
+            <a:camera prst="orthographicFront">
+              <a:rot lat="0" lon="0" rev="0"/>
+            </a:camera>
+            <a:lightRig rig="contrasting" dir="t">
+              <a:rot lat="0" lon="0" rev="1500000"/>
+            </a:lightRig>
+          </a:scene3d>
+          <a:sp3d prstMaterial="metal">
+            <a:bevelT w="88900" h="88900"/>
+          </a:sp3d>
+        </p:spPr>
+        <p:txBody>
+          <a:bodyPr wrap="square" rtlCol="0">
+            <a:spAutoFit/>
+          </a:bodyPr>
+          <a:lstStyle/>
+          <a:p>
+            <a:pPr marL="285750" indent="-285750">
+              <a:buFont typeface="Arial" panose="020B0604020202020204" pitchFamily="34" charset="0"/>
+              <a:buChar char="•"/>
+            </a:pPr>
+            <a:r>
+              <a:rPr lang="en-US" dirty="0"/>
+              <a:t>Human readable description</a:t>
+            </a:r>
+          </a:p>
+          <a:p>
+            <a:pPr marL="285750" indent="-285750">
+              <a:buFont typeface="Arial" panose="020B0604020202020204" pitchFamily="34" charset="0"/>
+              <a:buChar char="•"/>
+            </a:pPr>
+            <a:r>
+              <a:rPr lang="en-US" dirty="0"/>
+              <a:t>Groups longitudinal record of what has been extracted</a:t>
+            </a:r>
+          </a:p>
+        </p:txBody>
+      </p:sp>
+      <p:pic>
+        <p:nvPicPr>
+          <p:cNvPr id="3" name="Picture 2">
+            <a:extLst>
+              <a:ext uri="{FF2B5EF4-FFF2-40B4-BE49-F238E27FC236}">
+                <a16:creationId xmlns:a16="http://schemas.microsoft.com/office/drawing/2014/main" id="{4DC948A4-2804-491A-8FB1-DCC820A0BFDC}"/>
+              </a:ext>
+            </a:extLst>
+          </p:cNvPr>
+          <p:cNvPicPr>
+            <a:picLocks noChangeAspect="1"/>
+          </p:cNvPicPr>
+          <p:nvPr/>
+        </p:nvPicPr>
+        <p:blipFill>
+          <a:blip r:embed="rId2"/>
+          <a:stretch>
+            <a:fillRect/>
+          </a:stretch>
+        </p:blipFill>
+        <p:spPr>
+          <a:xfrm>
+            <a:off x="-1812573" y="8086338"/>
+            <a:ext cx="1581485" cy="1768262"/>
+          </a:xfrm>
+          <a:prstGeom prst="rect">
+            <a:avLst/>
+          </a:prstGeom>
+          <a:ln>
+            <a:noFill/>
+          </a:ln>
+          <a:effectLst>
+            <a:outerShdw blurRad="149987" dist="250190" dir="8460000" algn="ctr">
+              <a:srgbClr val="000000">
+                <a:alpha val="28000"/>
+              </a:srgbClr>
+            </a:outerShdw>
+          </a:effectLst>
+          <a:scene3d>
+            <a:camera prst="orthographicFront">
+              <a:rot lat="0" lon="0" rev="0"/>
+            </a:camera>
+            <a:lightRig rig="contrasting" dir="t">
+              <a:rot lat="0" lon="0" rev="1500000"/>
+            </a:lightRig>
+          </a:scene3d>
+          <a:sp3d prstMaterial="metal">
+            <a:bevelT w="88900" h="88900"/>
+          </a:sp3d>
+        </p:spPr>
+      </p:pic>
+      <p:cxnSp>
+        <p:nvCxnSpPr>
+          <p:cNvPr id="14" name="Straight Arrow Connector 13">
+            <a:extLst>
+              <a:ext uri="{FF2B5EF4-FFF2-40B4-BE49-F238E27FC236}">
+                <a16:creationId xmlns:a16="http://schemas.microsoft.com/office/drawing/2014/main" id="{8171AFE1-3135-4565-8BFC-FF624A86AE38}"/>
+              </a:ext>
+            </a:extLst>
+          </p:cNvPr>
+          <p:cNvCxnSpPr>
+            <a:cxnSpLocks/>
+            <a:stCxn id="9" idx="2"/>
+          </p:cNvCxnSpPr>
+          <p:nvPr/>
+        </p:nvCxnSpPr>
+        <p:spPr>
+          <a:xfrm>
+            <a:off x="-1019318" y="7749150"/>
+            <a:ext cx="0" cy="372964"/>
+          </a:xfrm>
+          <a:prstGeom prst="straightConnector1">
+            <a:avLst/>
+          </a:prstGeom>
+          <a:ln w="57150">
+            <a:solidFill>
+              <a:srgbClr val="4472C4">
+                <a:alpha val="38039"/>
+              </a:srgbClr>
+            </a:solidFill>
+            <a:tailEnd type="triangle"/>
+          </a:ln>
+        </p:spPr>
+        <p:style>
+          <a:lnRef idx="3">
+            <a:schemeClr val="accent1"/>
+          </a:lnRef>
+          <a:fillRef idx="0">
+            <a:schemeClr val="accent1"/>
+          </a:fillRef>
+          <a:effectRef idx="2">
+            <a:schemeClr val="accent1"/>
+          </a:effectRef>
+          <a:fontRef idx="minor">
+            <a:schemeClr val="tx1"/>
+          </a:fontRef>
+        </p:style>
+      </p:cxnSp>
+      <p:cxnSp>
+        <p:nvCxnSpPr>
+          <p:cNvPr id="27" name="Straight Arrow Connector 26">
+            <a:extLst>
+              <a:ext uri="{FF2B5EF4-FFF2-40B4-BE49-F238E27FC236}">
+                <a16:creationId xmlns:a16="http://schemas.microsoft.com/office/drawing/2014/main" id="{4E3BCF60-7238-4D0F-AA81-C494A06EB1C2}"/>
+              </a:ext>
+            </a:extLst>
+          </p:cNvPr>
+          <p:cNvCxnSpPr>
+            <a:cxnSpLocks/>
+            <a:stCxn id="26" idx="2"/>
+          </p:cNvCxnSpPr>
+          <p:nvPr/>
+        </p:nvCxnSpPr>
+        <p:spPr>
+          <a:xfrm>
+            <a:off x="-2574790" y="7742663"/>
+            <a:ext cx="1320665" cy="432962"/>
+          </a:xfrm>
+          <a:prstGeom prst="straightConnector1">
+            <a:avLst/>
+          </a:prstGeom>
+          <a:ln w="57150">
+            <a:solidFill>
+              <a:srgbClr val="4472C4">
+                <a:alpha val="38039"/>
+              </a:srgbClr>
+            </a:solidFill>
+            <a:tailEnd type="triangle"/>
+          </a:ln>
+        </p:spPr>
+        <p:style>
+          <a:lnRef idx="3">
+            <a:schemeClr val="accent1"/>
+          </a:lnRef>
+          <a:fillRef idx="0">
+            <a:schemeClr val="accent1"/>
+          </a:fillRef>
+          <a:effectRef idx="2">
+            <a:schemeClr val="accent1"/>
+          </a:effectRef>
+          <a:fontRef idx="minor">
+            <a:schemeClr val="tx1"/>
+          </a:fontRef>
+        </p:style>
+      </p:cxnSp>
+      <p:sp>
+        <p:nvSpPr>
+          <p:cNvPr id="53" name="TextBox 52">
+            <a:extLst>
+              <a:ext uri="{FF2B5EF4-FFF2-40B4-BE49-F238E27FC236}">
+                <a16:creationId xmlns:a16="http://schemas.microsoft.com/office/drawing/2014/main" id="{77456DF4-7EB1-4125-A89D-35DBF657B38D}"/>
+              </a:ext>
+            </a:extLst>
+          </p:cNvPr>
+          <p:cNvSpPr txBox="1"/>
+          <p:nvPr/>
+        </p:nvSpPr>
+        <p:spPr>
+          <a:xfrm>
+            <a:off x="-219595" y="8578091"/>
+            <a:ext cx="2990844" cy="646331"/>
+          </a:xfrm>
+          <a:prstGeom prst="rect">
+            <a:avLst/>
+          </a:prstGeom>
+          <a:noFill/>
+          <a:ln>
+            <a:noFill/>
+          </a:ln>
+          <a:effectLst>
+            <a:outerShdw blurRad="149987" dist="250190" dir="8460000" algn="ctr">
+              <a:srgbClr val="000000">
+                <a:alpha val="28000"/>
+              </a:srgbClr>
+            </a:outerShdw>
+          </a:effectLst>
+          <a:scene3d>
+            <a:camera prst="orthographicFront">
+              <a:rot lat="0" lon="0" rev="0"/>
+            </a:camera>
+            <a:lightRig rig="contrasting" dir="t">
+              <a:rot lat="0" lon="0" rev="1500000"/>
+            </a:lightRig>
+          </a:scene3d>
+          <a:sp3d prstMaterial="metal">
+            <a:bevelT w="88900" h="88900"/>
+          </a:sp3d>
+        </p:spPr>
+        <p:txBody>
+          <a:bodyPr wrap="square" rtlCol="0">
+            <a:spAutoFit/>
+          </a:bodyPr>
+          <a:lstStyle/>
+          <a:p>
+            <a:pPr marL="285750" indent="-285750">
+              <a:buFont typeface="Arial" panose="020B0604020202020204" pitchFamily="34" charset="0"/>
+              <a:buChar char="•"/>
+            </a:pPr>
+            <a:r>
+              <a:rPr lang="en-US" dirty="0"/>
+              <a:t>Database</a:t>
+            </a:r>
+          </a:p>
+          <a:p>
+            <a:pPr marL="285750" indent="-285750">
+              <a:buFont typeface="Arial" panose="020B0604020202020204" pitchFamily="34" charset="0"/>
+              <a:buChar char="•"/>
+            </a:pPr>
+            <a:r>
+              <a:rPr lang="en-US" dirty="0"/>
+              <a:t>MySql / Sql Server / Oracle</a:t>
+            </a:r>
+          </a:p>
+        </p:txBody>
+      </p:sp>
+      <p:sp>
+        <p:nvSpPr>
+          <p:cNvPr id="85" name="TextBox 84">
+            <a:extLst>
+              <a:ext uri="{FF2B5EF4-FFF2-40B4-BE49-F238E27FC236}">
+                <a16:creationId xmlns:a16="http://schemas.microsoft.com/office/drawing/2014/main" id="{C5A32537-416D-477E-BF87-4C16391A6358}"/>
+              </a:ext>
+            </a:extLst>
+          </p:cNvPr>
+          <p:cNvSpPr txBox="1"/>
+          <p:nvPr/>
+        </p:nvSpPr>
+        <p:spPr>
+          <a:xfrm>
+            <a:off x="1404442" y="1328410"/>
+            <a:ext cx="3197991" cy="646331"/>
+          </a:xfrm>
+          <a:prstGeom prst="rect">
+            <a:avLst/>
+          </a:prstGeom>
+          <a:noFill/>
+          <a:ln>
+            <a:noFill/>
+          </a:ln>
+          <a:effectLst>
+            <a:outerShdw blurRad="149987" dist="250190" dir="8460000" algn="ctr">
+              <a:srgbClr val="000000">
+                <a:alpha val="28000"/>
+              </a:srgbClr>
+            </a:outerShdw>
+          </a:effectLst>
+          <a:scene3d>
+            <a:camera prst="orthographicFront">
+              <a:rot lat="0" lon="0" rev="0"/>
+            </a:camera>
+            <a:lightRig rig="contrasting" dir="t">
+              <a:rot lat="0" lon="0" rev="1500000"/>
+            </a:lightRig>
+          </a:scene3d>
+          <a:sp3d prstMaterial="metal">
+            <a:bevelT w="88900" h="88900"/>
+          </a:sp3d>
+        </p:spPr>
+        <p:txBody>
+          <a:bodyPr wrap="square" rtlCol="0">
+            <a:spAutoFit/>
+          </a:bodyPr>
+          <a:lstStyle/>
+          <a:p>
+            <a:pPr marL="285750" indent="-285750">
+              <a:buFont typeface="Arial" panose="020B0604020202020204" pitchFamily="34" charset="0"/>
+              <a:buChar char="•"/>
+            </a:pPr>
+            <a:r>
+              <a:rPr lang="en-US" dirty="0"/>
+              <a:t>Marks a Catalogue as extractable in projects</a:t>
+            </a:r>
+          </a:p>
+        </p:txBody>
+      </p:sp>
+      <p:sp>
+        <p:nvSpPr>
+          <p:cNvPr id="18" name="TextBox 17">
+            <a:extLst>
+              <a:ext uri="{FF2B5EF4-FFF2-40B4-BE49-F238E27FC236}">
+                <a16:creationId xmlns:a16="http://schemas.microsoft.com/office/drawing/2014/main" id="{6AE76170-0470-4FED-8BC4-DDFEC7936D00}"/>
+              </a:ext>
+            </a:extLst>
+          </p:cNvPr>
+          <p:cNvSpPr txBox="1"/>
+          <p:nvPr/>
+        </p:nvSpPr>
+        <p:spPr>
+          <a:xfrm>
+            <a:off x="-294504" y="7233197"/>
+            <a:ext cx="2990844" cy="369332"/>
+          </a:xfrm>
+          <a:prstGeom prst="rect">
+            <a:avLst/>
+          </a:prstGeom>
+          <a:noFill/>
+          <a:ln>
+            <a:noFill/>
+          </a:ln>
+          <a:effectLst>
+            <a:outerShdw blurRad="149987" dist="250190" dir="8460000" algn="ctr">
+              <a:srgbClr val="000000">
+                <a:alpha val="28000"/>
+              </a:srgbClr>
+            </a:outerShdw>
+          </a:effectLst>
+          <a:scene3d>
+            <a:camera prst="orthographicFront">
+              <a:rot lat="0" lon="0" rev="0"/>
+            </a:camera>
+            <a:lightRig rig="contrasting" dir="t">
+              <a:rot lat="0" lon="0" rev="1500000"/>
+            </a:lightRig>
+          </a:scene3d>
+          <a:sp3d prstMaterial="metal">
+            <a:bevelT w="88900" h="88900"/>
+          </a:sp3d>
+        </p:spPr>
+        <p:txBody>
+          <a:bodyPr wrap="square" rtlCol="0">
+            <a:spAutoFit/>
+          </a:bodyPr>
+          <a:lstStyle/>
+          <a:p>
+            <a:pPr marL="285750" indent="-285750">
+              <a:buFont typeface="Arial" panose="020B0604020202020204" pitchFamily="34" charset="0"/>
+              <a:buChar char="•"/>
+            </a:pPr>
+            <a:r>
+              <a:rPr lang="en-US" dirty="0"/>
+              <a:t>Caches state</a:t>
+            </a:r>
+          </a:p>
+        </p:txBody>
+      </p:sp>
+      <p:sp>
+        <p:nvSpPr>
+          <p:cNvPr id="19" name="TextBox 18">
+            <a:extLst>
+              <a:ext uri="{FF2B5EF4-FFF2-40B4-BE49-F238E27FC236}">
+                <a16:creationId xmlns:a16="http://schemas.microsoft.com/office/drawing/2014/main" id="{47D2B6D6-D287-4BB2-B4BB-931EACBEE0A3}"/>
+              </a:ext>
+            </a:extLst>
+          </p:cNvPr>
+          <p:cNvSpPr txBox="1"/>
+          <p:nvPr/>
+        </p:nvSpPr>
+        <p:spPr>
+          <a:xfrm>
+            <a:off x="-1417539" y="5871904"/>
+            <a:ext cx="2246069" cy="923330"/>
+          </a:xfrm>
+          <a:prstGeom prst="rect">
+            <a:avLst/>
+          </a:prstGeom>
+          <a:noFill/>
+          <a:ln>
+            <a:noFill/>
+          </a:ln>
+          <a:effectLst>
+            <a:outerShdw blurRad="149987" dist="250190" dir="8460000" algn="ctr">
+              <a:srgbClr val="000000">
+                <a:alpha val="28000"/>
+              </a:srgbClr>
+            </a:outerShdw>
+          </a:effectLst>
+          <a:scene3d>
+            <a:camera prst="orthographicFront">
+              <a:rot lat="0" lon="0" rev="0"/>
+            </a:camera>
+            <a:lightRig rig="contrasting" dir="t">
+              <a:rot lat="0" lon="0" rev="1500000"/>
+            </a:lightRig>
+          </a:scene3d>
+          <a:sp3d prstMaterial="metal">
+            <a:bevelT w="88900" h="88900"/>
+          </a:sp3d>
+        </p:spPr>
+        <p:txBody>
+          <a:bodyPr wrap="square" rtlCol="0">
+            <a:spAutoFit/>
+          </a:bodyPr>
+          <a:lstStyle/>
+          <a:p>
+            <a:pPr marL="285750" indent="-285750">
+              <a:buFont typeface="Arial" panose="020B0604020202020204" pitchFamily="34" charset="0"/>
+              <a:buChar char="•"/>
+            </a:pPr>
+            <a:r>
+              <a:rPr lang="en-US" dirty="0"/>
+              <a:t>Caches state</a:t>
+            </a:r>
+          </a:p>
+          <a:p>
+            <a:pPr marL="285750" indent="-285750">
+              <a:buFont typeface="Arial" panose="020B0604020202020204" pitchFamily="34" charset="0"/>
+              <a:buChar char="•"/>
+            </a:pPr>
+            <a:r>
+              <a:rPr lang="en-US" dirty="0"/>
+              <a:t>Can store access credentials</a:t>
+            </a:r>
+            <a:endParaRPr lang="en-GB" dirty="0"/>
+          </a:p>
+        </p:txBody>
+      </p:sp>
+      <p:sp>
+        <p:nvSpPr>
+          <p:cNvPr id="39" name="TextBox 38">
+            <a:extLst>
+              <a:ext uri="{FF2B5EF4-FFF2-40B4-BE49-F238E27FC236}">
+                <a16:creationId xmlns:a16="http://schemas.microsoft.com/office/drawing/2014/main" id="{DC7D3AE6-A9CE-44C3-BE99-DECDE18B16A0}"/>
+              </a:ext>
+            </a:extLst>
+          </p:cNvPr>
+          <p:cNvSpPr txBox="1"/>
+          <p:nvPr/>
+        </p:nvSpPr>
+        <p:spPr>
+          <a:xfrm>
+            <a:off x="1404442" y="4645628"/>
+            <a:ext cx="3197991" cy="1200329"/>
+          </a:xfrm>
+          <a:prstGeom prst="rect">
+            <a:avLst/>
+          </a:prstGeom>
+          <a:noFill/>
+          <a:ln>
+            <a:noFill/>
+          </a:ln>
+          <a:effectLst>
+            <a:outerShdw blurRad="149987" dist="250190" dir="8460000" algn="ctr">
+              <a:srgbClr val="000000">
+                <a:alpha val="28000"/>
+              </a:srgbClr>
+            </a:outerShdw>
+          </a:effectLst>
+          <a:scene3d>
+            <a:camera prst="orthographicFront">
+              <a:rot lat="0" lon="0" rev="0"/>
+            </a:camera>
+            <a:lightRig rig="contrasting" dir="t">
+              <a:rot lat="0" lon="0" rev="1500000"/>
+            </a:lightRig>
+          </a:scene3d>
+          <a:sp3d prstMaterial="metal">
+            <a:bevelT w="88900" h="88900"/>
+          </a:sp3d>
+        </p:spPr>
+        <p:txBody>
+          <a:bodyPr wrap="square" rtlCol="0">
+            <a:spAutoFit/>
+          </a:bodyPr>
+          <a:lstStyle/>
+          <a:p>
+            <a:pPr marL="285750" indent="-285750">
+              <a:buFont typeface="Arial" panose="020B0604020202020204" pitchFamily="34" charset="0"/>
+              <a:buChar char="•"/>
+            </a:pPr>
+            <a:r>
+              <a:rPr lang="en-US" dirty="0"/>
+              <a:t>How column is extracted</a:t>
+            </a:r>
+          </a:p>
+          <a:p>
+            <a:pPr marL="285750" indent="-285750">
+              <a:buFont typeface="Arial" panose="020B0604020202020204" pitchFamily="34" charset="0"/>
+              <a:buChar char="•"/>
+            </a:pPr>
+            <a:r>
+              <a:rPr lang="en-US" dirty="0"/>
+              <a:t>Governance (e.g. Special Approval Required)</a:t>
+            </a:r>
+          </a:p>
+          <a:p>
+            <a:pPr marL="285750" indent="-285750">
+              <a:buFont typeface="Arial" panose="020B0604020202020204" pitchFamily="34" charset="0"/>
+              <a:buChar char="•"/>
+            </a:pPr>
+            <a:r>
+              <a:rPr lang="en-US" dirty="0"/>
+              <a:t>Contains Patient Identifiers?</a:t>
+            </a:r>
+            <a:endParaRPr lang="en-GB" dirty="0"/>
+          </a:p>
+        </p:txBody>
+      </p:sp>
+    </p:spTree>
+    <p:extLst>
+      <p:ext uri="{BB962C8B-B14F-4D97-AF65-F5344CB8AC3E}">
+        <p14:creationId xmlns:p14="http://schemas.microsoft.com/office/powerpoint/2010/main" val="3562119201"/>
       </p:ext>
     </p:extLst>
   </p:cSld>
@@ -7394,10 +10353,9 @@
           <a:p>
             <a:pPr algn="ctr"/>
             <a:r>
-              <a:rPr lang="en-US" sz="1000" dirty="0" err="1"/>
+              <a:rPr lang="en-US" sz="1000" dirty="0"/>
               <a:t>Summarisation</a:t>
             </a:r>
-            <a:endParaRPr lang="en-US" sz="1000" dirty="0"/>
           </a:p>
         </p:txBody>
       </p:sp>
@@ -7646,7 +10604,7 @@
           <a:bodyPr/>
           <a:lstStyle/>
           <a:p>
-            <a:endParaRPr lang="en-GB"/>
+            <a:endParaRPr lang="en-GB" dirty="0"/>
           </a:p>
         </p:txBody>
       </p:sp>
@@ -8531,10 +11489,9 @@
           <a:p>
             <a:pPr algn="ctr"/>
             <a:r>
-              <a:rPr lang="en-US" sz="1000" dirty="0" err="1"/>
+              <a:rPr lang="en-US" sz="1000" dirty="0"/>
               <a:t>Summarisation</a:t>
             </a:r>
-            <a:endParaRPr lang="en-US" sz="1000" dirty="0"/>
           </a:p>
         </p:txBody>
       </p:sp>
@@ -8770,7 +11727,7 @@
           <a:bodyPr/>
           <a:lstStyle/>
           <a:p>
-            <a:endParaRPr lang="en-GB"/>
+            <a:endParaRPr lang="en-GB" dirty="0"/>
           </a:p>
         </p:txBody>
       </p:sp>
@@ -8842,7 +11799,7 @@
           <a:bodyPr/>
           <a:lstStyle/>
           <a:p>
-            <a:endParaRPr lang="en-GB"/>
+            <a:endParaRPr lang="en-GB" dirty="0"/>
           </a:p>
         </p:txBody>
       </p:sp>
@@ -9002,7 +11959,7 @@
           <a:bodyPr/>
           <a:lstStyle/>
           <a:p>
-            <a:endParaRPr lang="en-GB"/>
+            <a:endParaRPr lang="en-GB" dirty="0"/>
           </a:p>
         </p:txBody>
       </p:sp>
@@ -9021,7 +11978,7 @@
           <a:bodyPr/>
           <a:lstStyle/>
           <a:p>
-            <a:endParaRPr lang="en-GB"/>
+            <a:endParaRPr lang="en-GB" dirty="0"/>
           </a:p>
         </p:txBody>
       </p:sp>

</xml_diff>